<commit_message>
updated deck with RTM code snippets & correct REST URL paths
</commit_message>
<xml_diff>
--- a/O3653-2 Deep Dive into Office 365 APIs for Calendar, Mail, and Contacts/O3653-2 Deep Dive into Office 365 APIs for Calendar, Mail, and Contacts.pptx
+++ b/O3653-2 Deep Dive into Office 365 APIs for Calendar, Mail, and Contacts/O3653-2 Deep Dive into Office 365 APIs for Calendar, Mail, and Contacts.pptx
@@ -351,7 +351,7 @@
           <a:p>
             <a:fld id="{DE219B1A-AE41-483B-A766-69B9363DDA6A}" type="datetimeFigureOut">
               <a:rPr lang="en-US" smtClean="0"/>
-              <a:t>10/3/2014</a:t>
+              <a:t>11/14/2014</a:t>
             </a:fld>
             <a:endParaRPr lang="en-US"/>
           </a:p>
@@ -633,7 +633,7 @@
           <a:p>
             <a:fld id="{D51B1278-D92B-4AF3-A9C1-71DD298190CE}" type="datetimeFigureOut">
               <a:rPr lang="en-US" smtClean="0"/>
-              <a:t>10/3/2014</a:t>
+              <a:t>11/14/2014</a:t>
             </a:fld>
             <a:endParaRPr lang="en-US"/>
           </a:p>
@@ -1252,7 +1252,7 @@
           <a:p>
             <a:fld id="{E74353ED-ACB2-44BF-A903-985B0AF962B7}" type="datetime1">
               <a:rPr lang="en-US" smtClean="0"/>
-              <a:t>10/3/2014</a:t>
+              <a:t>11/14/2014</a:t>
             </a:fld>
             <a:endParaRPr lang="en-US" dirty="0"/>
           </a:p>
@@ -1471,7 +1471,7 @@
           <a:p>
             <a:fld id="{0BB6559B-C68D-49B4-97AE-9BB74C417927}" type="datetime1">
               <a:rPr lang="en-US" smtClean="0"/>
-              <a:t>10/3/2014</a:t>
+              <a:t>11/14/2014</a:t>
             </a:fld>
             <a:endParaRPr lang="en-US"/>
           </a:p>
@@ -1632,7 +1632,7 @@
           <a:p>
             <a:fld id="{B079C3B8-7366-4A44-A34B-3977080C19E7}" type="datetime1">
               <a:rPr lang="en-US" smtClean="0"/>
-              <a:t>10/3/2014</a:t>
+              <a:t>11/14/2014</a:t>
             </a:fld>
             <a:endParaRPr lang="en-US" dirty="0"/>
           </a:p>
@@ -1763,7 +1763,7 @@
           <a:p>
             <a:fld id="{F4ED0980-F356-492E-AEE0-341D5AB7B1F8}" type="datetime1">
               <a:rPr lang="en-US" smtClean="0"/>
-              <a:t>10/3/2014</a:t>
+              <a:t>11/14/2014</a:t>
             </a:fld>
             <a:endParaRPr lang="en-US"/>
           </a:p>
@@ -1969,7 +1969,7 @@
           <a:p>
             <a:fld id="{23FDFFE0-9E47-4B8C-842E-FA426FE218C8}" type="datetime1">
               <a:rPr lang="en-US" smtClean="0"/>
-              <a:t>10/3/2014</a:t>
+              <a:t>11/14/2014</a:t>
             </a:fld>
             <a:endParaRPr lang="en-US"/>
           </a:p>
@@ -2175,7 +2175,7 @@
           <a:p>
             <a:fld id="{25C53C72-BBB8-414B-86FA-E1FA1F2BC8CE}" type="datetime1">
               <a:rPr lang="en-US" smtClean="0"/>
-              <a:t>10/3/2014</a:t>
+              <a:t>11/14/2014</a:t>
             </a:fld>
             <a:endParaRPr lang="en-US"/>
           </a:p>
@@ -2418,7 +2418,7 @@
                 </a:solidFill>
               </a:rPr>
               <a:pPr/>
-              <a:t>10/3/2014</a:t>
+              <a:t>11/14/2014</a:t>
             </a:fld>
             <a:endParaRPr lang="en-US" dirty="0">
               <a:solidFill>
@@ -2576,7 +2576,7 @@
           <a:p>
             <a:fld id="{9F6C2A45-62A9-453C-B1A0-E9BD4232256A}" type="datetime1">
               <a:rPr lang="en-US" smtClean="0"/>
-              <a:t>10/3/2014</a:t>
+              <a:t>11/14/2014</a:t>
             </a:fld>
             <a:endParaRPr lang="en-US"/>
           </a:p>
@@ -2836,7 +2836,7 @@
           <a:p>
             <a:fld id="{B079C3B8-7366-4A44-A34B-3977080C19E7}" type="datetime1">
               <a:rPr lang="en-US" smtClean="0"/>
-              <a:t>10/3/2014</a:t>
+              <a:t>11/14/2014</a:t>
             </a:fld>
             <a:endParaRPr lang="en-US" dirty="0"/>
           </a:p>
@@ -2977,7 +2977,7 @@
                 </a:solidFill>
               </a:rPr>
               <a:pPr/>
-              <a:t>10/3/2014</a:t>
+              <a:t>11/14/2014</a:t>
             </a:fld>
             <a:endParaRPr lang="en-US" dirty="0">
               <a:solidFill>
@@ -13202,7 +13202,6 @@
               <a:rPr lang="en-US" dirty="0"/>
               <a:t>October 2014</a:t>
             </a:r>
-            <a:endParaRPr lang="en-US" dirty="0"/>
           </a:p>
         </p:txBody>
       </p:sp>
@@ -13403,129 +13402,124 @@
           </a:ln>
         </p:spPr>
       </p:pic>
-      <p:grpSp>
-        <p:nvGrpSpPr>
-          <p:cNvPr id="9" name="Group 8"/>
-          <p:cNvGrpSpPr/>
+      <p:sp>
+        <p:nvSpPr>
+          <p:cNvPr id="8" name="Rectangle 7"/>
+          <p:cNvSpPr/>
           <p:nvPr/>
-        </p:nvGrpSpPr>
-        <p:grpSpPr>
+        </p:nvSpPr>
+        <p:spPr bwMode="auto">
           <a:xfrm>
             <a:off x="7454569" y="1945448"/>
-            <a:ext cx="2952750" cy="3488624"/>
-            <a:chOff x="4618037" y="1497713"/>
-            <a:chExt cx="2952750" cy="3488624"/>
+            <a:ext cx="2952750" cy="373949"/>
           </a:xfrm>
-        </p:grpSpPr>
-        <p:pic>
-          <p:nvPicPr>
-            <p:cNvPr id="7" name="Picture 6"/>
-            <p:cNvPicPr>
-              <a:picLocks noChangeAspect="1"/>
-            </p:cNvPicPr>
-            <p:nvPr/>
-          </p:nvPicPr>
-          <p:blipFill>
-            <a:blip r:embed="rId3"/>
-            <a:stretch>
-              <a:fillRect/>
-            </a:stretch>
-          </p:blipFill>
-          <p:spPr>
-            <a:xfrm>
-              <a:off x="4618037" y="1871662"/>
-              <a:ext cx="2952750" cy="3114675"/>
-            </a:xfrm>
-            <a:prstGeom prst="rect">
+          <a:prstGeom prst="rect">
+            <a:avLst/>
+          </a:prstGeom>
+          <a:solidFill>
+            <a:schemeClr val="accent5"/>
+          </a:solidFill>
+          <a:ln>
+            <a:noFill/>
+            <a:headEnd type="none" w="med" len="med"/>
+            <a:tailEnd type="none" w="med" len="med"/>
+          </a:ln>
+          <a:effectLst/>
+        </p:spPr>
+        <p:style>
+          <a:lnRef idx="1">
+            <a:schemeClr val="accent2"/>
+          </a:lnRef>
+          <a:fillRef idx="3">
+            <a:schemeClr val="accent2"/>
+          </a:fillRef>
+          <a:effectRef idx="2">
+            <a:schemeClr val="accent2"/>
+          </a:effectRef>
+          <a:fontRef idx="minor">
+            <a:schemeClr val="lt1"/>
+          </a:fontRef>
+        </p:style>
+        <p:txBody>
+          <a:bodyPr rot="0" spcFirstLastPara="0" vertOverflow="overflow" horzOverflow="overflow" vert="horz" wrap="square" lIns="45720" tIns="45720" rIns="45720" bIns="45720" numCol="1" spcCol="0" rtlCol="0" fromWordArt="0" anchor="ctr" anchorCtr="0" forceAA="0" compatLnSpc="1">
+            <a:prstTxWarp prst="textNoShape">
               <a:avLst/>
-            </a:prstGeom>
-            <a:ln>
-              <a:solidFill>
-                <a:schemeClr val="bg1">
-                  <a:lumMod val="50000"/>
-                </a:schemeClr>
-              </a:solidFill>
-            </a:ln>
-          </p:spPr>
-        </p:pic>
-        <p:sp>
-          <p:nvSpPr>
-            <p:cNvPr id="8" name="Rectangle 7"/>
-            <p:cNvSpPr/>
-            <p:nvPr/>
-          </p:nvSpPr>
-          <p:spPr bwMode="auto">
-            <a:xfrm>
-              <a:off x="4618037" y="1497713"/>
-              <a:ext cx="2952750" cy="373949"/>
-            </a:xfrm>
-            <a:prstGeom prst="rect">
-              <a:avLst/>
-            </a:prstGeom>
-            <a:solidFill>
-              <a:schemeClr val="accent5"/>
-            </a:solidFill>
-            <a:ln>
-              <a:noFill/>
-              <a:headEnd type="none" w="med" len="med"/>
-              <a:tailEnd type="none" w="med" len="med"/>
-            </a:ln>
-            <a:effectLst/>
-          </p:spPr>
-          <p:style>
-            <a:lnRef idx="1">
-              <a:schemeClr val="accent2"/>
-            </a:lnRef>
-            <a:fillRef idx="3">
-              <a:schemeClr val="accent2"/>
-            </a:fillRef>
-            <a:effectRef idx="2">
-              <a:schemeClr val="accent2"/>
-            </a:effectRef>
-            <a:fontRef idx="minor">
-              <a:schemeClr val="lt1"/>
-            </a:fontRef>
-          </p:style>
-          <p:txBody>
-            <a:bodyPr rot="0" spcFirstLastPara="0" vertOverflow="overflow" horzOverflow="overflow" vert="horz" wrap="square" lIns="45720" tIns="45720" rIns="45720" bIns="45720" numCol="1" spcCol="0" rtlCol="0" fromWordArt="0" anchor="ctr" anchorCtr="0" forceAA="0" compatLnSpc="1">
-              <a:prstTxWarp prst="textNoShape">
-                <a:avLst/>
-              </a:prstTxWarp>
-              <a:noAutofit/>
-            </a:bodyPr>
-            <a:lstStyle/>
-            <a:p>
-              <a:pPr algn="ctr" defTabSz="914099" fontAlgn="base">
-                <a:spcBef>
-                  <a:spcPct val="0"/>
-                </a:spcBef>
-                <a:spcAft>
-                  <a:spcPct val="0"/>
-                </a:spcAft>
-              </a:pPr>
-              <a:r>
-                <a:rPr lang="en-US" dirty="0" smtClean="0">
-                  <a:gradFill>
-                    <a:gsLst>
-                      <a:gs pos="0">
-                        <a:srgbClr val="FFFFFF"/>
-                      </a:gs>
-                      <a:gs pos="100000">
-                        <a:srgbClr val="FFFFFF"/>
-                      </a:gs>
-                    </a:gsLst>
-                    <a:lin ang="5400000" scaled="0"/>
-                  </a:gradFill>
-                  <a:latin typeface="Arial" panose="020B0604020202020204" pitchFamily="34" charset="0"/>
-                  <a:ea typeface="Segoe UI" pitchFamily="34" charset="0"/>
-                  <a:cs typeface="Arial" panose="020B0604020202020204" pitchFamily="34" charset="0"/>
-                </a:rPr>
-                <a:t>Contact</a:t>
-              </a:r>
-            </a:p>
-          </p:txBody>
-        </p:sp>
-      </p:grpSp>
+            </a:prstTxWarp>
+            <a:noAutofit/>
+          </a:bodyPr>
+          <a:lstStyle/>
+          <a:p>
+            <a:pPr algn="ctr" defTabSz="914099" fontAlgn="base">
+              <a:spcBef>
+                <a:spcPct val="0"/>
+              </a:spcBef>
+              <a:spcAft>
+                <a:spcPct val="0"/>
+              </a:spcAft>
+            </a:pPr>
+            <a:r>
+              <a:rPr lang="en-US" dirty="0" smtClean="0">
+                <a:gradFill>
+                  <a:gsLst>
+                    <a:gs pos="0">
+                      <a:srgbClr val="FFFFFF"/>
+                    </a:gs>
+                    <a:gs pos="100000">
+                      <a:srgbClr val="FFFFFF"/>
+                    </a:gs>
+                  </a:gsLst>
+                  <a:lin ang="5400000" scaled="0"/>
+                </a:gradFill>
+                <a:latin typeface="Arial" panose="020B0604020202020204" pitchFamily="34" charset="0"/>
+                <a:ea typeface="Segoe UI" pitchFamily="34" charset="0"/>
+                <a:cs typeface="Arial" panose="020B0604020202020204" pitchFamily="34" charset="0"/>
+              </a:rPr>
+              <a:t>Contact</a:t>
+            </a:r>
+          </a:p>
+        </p:txBody>
+      </p:sp>
+      <p:pic>
+        <p:nvPicPr>
+          <p:cNvPr id="1026" name="Picture 2" descr="D:\Users\andrew\AppData\Local\Temp\SNAGHTML379cbf6.PNG"/>
+          <p:cNvPicPr>
+            <a:picLocks noChangeAspect="1" noChangeArrowheads="1"/>
+          </p:cNvPicPr>
+          <p:nvPr/>
+        </p:nvPicPr>
+        <p:blipFill>
+          <a:blip r:embed="rId3">
+            <a:extLst>
+              <a:ext uri="{28A0092B-C50C-407E-A947-70E740481C1C}">
+                <a14:useLocalDpi xmlns:a14="http://schemas.microsoft.com/office/drawing/2010/main" val="0"/>
+              </a:ext>
+            </a:extLst>
+          </a:blip>
+          <a:srcRect/>
+          <a:stretch>
+            <a:fillRect/>
+          </a:stretch>
+        </p:blipFill>
+        <p:spPr bwMode="auto">
+          <a:xfrm>
+            <a:off x="7324729" y="2319397"/>
+            <a:ext cx="3190875" cy="2809876"/>
+          </a:xfrm>
+          <a:prstGeom prst="rect">
+            <a:avLst/>
+          </a:prstGeom>
+          <a:noFill/>
+          <a:extLst>
+            <a:ext uri="{909E8E84-426E-40DD-AFC4-6F175D3DCCD1}">
+              <a14:hiddenFill xmlns:a14="http://schemas.microsoft.com/office/drawing/2010/main">
+                <a:solidFill>
+                  <a:srgbClr val="FFFFFF"/>
+                </a:solidFill>
+              </a14:hiddenFill>
+            </a:ext>
+          </a:extLst>
+        </p:spPr>
+      </p:pic>
     </p:spTree>
     <p:extLst>
       <p:ext uri="{BB962C8B-B14F-4D97-AF65-F5344CB8AC3E}">
@@ -14513,157 +14507,6 @@
       </p:sp>
       <p:grpSp>
         <p:nvGrpSpPr>
-          <p:cNvPr id="7" name="Group 6"/>
-          <p:cNvGrpSpPr/>
-          <p:nvPr/>
-        </p:nvGrpSpPr>
-        <p:grpSpPr>
-          <a:xfrm>
-            <a:off x="1081386" y="2801354"/>
-            <a:ext cx="3110804" cy="1901832"/>
-            <a:chOff x="3998912" y="2147887"/>
-            <a:chExt cx="4191000" cy="2562225"/>
-          </a:xfrm>
-        </p:grpSpPr>
-        <p:pic>
-          <p:nvPicPr>
-            <p:cNvPr id="5" name="Picture 4"/>
-            <p:cNvPicPr>
-              <a:picLocks noChangeAspect="1"/>
-            </p:cNvPicPr>
-            <p:nvPr/>
-          </p:nvPicPr>
-          <p:blipFill>
-            <a:blip r:embed="rId2"/>
-            <a:stretch>
-              <a:fillRect/>
-            </a:stretch>
-          </p:blipFill>
-          <p:spPr>
-            <a:xfrm>
-              <a:off x="3998912" y="2147887"/>
-              <a:ext cx="4191000" cy="2562225"/>
-            </a:xfrm>
-            <a:prstGeom prst="rect">
-              <a:avLst/>
-            </a:prstGeom>
-            <a:ln>
-              <a:solidFill>
-                <a:schemeClr val="bg1">
-                  <a:lumMod val="50000"/>
-                </a:schemeClr>
-              </a:solidFill>
-            </a:ln>
-          </p:spPr>
-        </p:pic>
-        <p:sp>
-          <p:nvSpPr>
-            <p:cNvPr id="6" name="Rectangle 5"/>
-            <p:cNvSpPr/>
-            <p:nvPr/>
-          </p:nvSpPr>
-          <p:spPr bwMode="auto">
-            <a:xfrm>
-              <a:off x="4068566" y="3491435"/>
-              <a:ext cx="2188396" cy="556583"/>
-            </a:xfrm>
-            <a:prstGeom prst="rect">
-              <a:avLst/>
-            </a:prstGeom>
-            <a:noFill/>
-            <a:ln w="28575">
-              <a:solidFill>
-                <a:srgbClr val="C00000"/>
-              </a:solidFill>
-              <a:prstDash val="sysDash"/>
-              <a:headEnd type="none" w="med" len="med"/>
-              <a:tailEnd type="none" w="med" len="med"/>
-            </a:ln>
-            <a:effectLst/>
-          </p:spPr>
-          <p:style>
-            <a:lnRef idx="1">
-              <a:schemeClr val="accent2"/>
-            </a:lnRef>
-            <a:fillRef idx="3">
-              <a:schemeClr val="accent2"/>
-            </a:fillRef>
-            <a:effectRef idx="2">
-              <a:schemeClr val="accent2"/>
-            </a:effectRef>
-            <a:fontRef idx="minor">
-              <a:schemeClr val="lt1"/>
-            </a:fontRef>
-          </p:style>
-          <p:txBody>
-            <a:bodyPr rot="0" spcFirstLastPara="0" vertOverflow="overflow" horzOverflow="overflow" vert="horz" wrap="square" lIns="45720" tIns="45720" rIns="45720" bIns="45720" numCol="1" spcCol="0" rtlCol="0" fromWordArt="0" anchor="ctr" anchorCtr="0" forceAA="0" compatLnSpc="1">
-              <a:prstTxWarp prst="textNoShape">
-                <a:avLst/>
-              </a:prstTxWarp>
-              <a:noAutofit/>
-            </a:bodyPr>
-            <a:lstStyle/>
-            <a:p>
-              <a:pPr algn="ctr" defTabSz="914099" fontAlgn="base">
-                <a:spcBef>
-                  <a:spcPct val="0"/>
-                </a:spcBef>
-                <a:spcAft>
-                  <a:spcPct val="0"/>
-                </a:spcAft>
-              </a:pPr>
-              <a:endParaRPr lang="en-US" sz="2200" dirty="0" smtClean="0">
-                <a:gradFill>
-                  <a:gsLst>
-                    <a:gs pos="0">
-                      <a:srgbClr val="FFFFFF"/>
-                    </a:gs>
-                    <a:gs pos="100000">
-                      <a:srgbClr val="FFFFFF"/>
-                    </a:gs>
-                  </a:gsLst>
-                  <a:lin ang="5400000" scaled="0"/>
-                </a:gradFill>
-                <a:ea typeface="Segoe UI" pitchFamily="34" charset="0"/>
-                <a:cs typeface="Segoe UI" pitchFamily="34" charset="0"/>
-              </a:endParaRPr>
-            </a:p>
-          </p:txBody>
-        </p:sp>
-      </p:grpSp>
-      <p:pic>
-        <p:nvPicPr>
-          <p:cNvPr id="8" name="Picture 7"/>
-          <p:cNvPicPr>
-            <a:picLocks noChangeAspect="1"/>
-          </p:cNvPicPr>
-          <p:nvPr/>
-        </p:nvPicPr>
-        <p:blipFill>
-          <a:blip r:embed="rId3"/>
-          <a:stretch>
-            <a:fillRect/>
-          </a:stretch>
-        </p:blipFill>
-        <p:spPr>
-          <a:xfrm>
-            <a:off x="7356297" y="1057616"/>
-            <a:ext cx="4643920" cy="5655547"/>
-          </a:xfrm>
-          <a:prstGeom prst="rect">
-            <a:avLst/>
-          </a:prstGeom>
-          <a:ln>
-            <a:solidFill>
-              <a:schemeClr val="bg1">
-                <a:lumMod val="50000"/>
-              </a:schemeClr>
-            </a:solidFill>
-          </a:ln>
-        </p:spPr>
-      </p:pic>
-      <p:grpSp>
-        <p:nvGrpSpPr>
           <p:cNvPr id="11" name="Group 10"/>
           <p:cNvGrpSpPr/>
           <p:nvPr/>
@@ -14685,7 +14528,7 @@
             <p:nvPr/>
           </p:nvPicPr>
           <p:blipFill>
-            <a:blip r:embed="rId4"/>
+            <a:blip r:embed="rId2"/>
             <a:stretch>
               <a:fillRect/>
             </a:stretch>
@@ -14782,6 +14625,54 @@
           </p:txBody>
         </p:sp>
       </p:grpSp>
+      <p:pic>
+        <p:nvPicPr>
+          <p:cNvPr id="14" name="Picture 13"/>
+          <p:cNvPicPr>
+            <a:picLocks noChangeAspect="1"/>
+          </p:cNvPicPr>
+          <p:nvPr/>
+        </p:nvPicPr>
+        <p:blipFill>
+          <a:blip r:embed="rId3"/>
+          <a:stretch>
+            <a:fillRect/>
+          </a:stretch>
+        </p:blipFill>
+        <p:spPr>
+          <a:xfrm>
+            <a:off x="1081386" y="2817975"/>
+            <a:ext cx="4019048" cy="1790476"/>
+          </a:xfrm>
+          <a:prstGeom prst="rect">
+            <a:avLst/>
+          </a:prstGeom>
+        </p:spPr>
+      </p:pic>
+      <p:pic>
+        <p:nvPicPr>
+          <p:cNvPr id="15" name="Picture 14"/>
+          <p:cNvPicPr>
+            <a:picLocks noChangeAspect="1"/>
+          </p:cNvPicPr>
+          <p:nvPr/>
+        </p:nvPicPr>
+        <p:blipFill>
+          <a:blip r:embed="rId4"/>
+          <a:stretch>
+            <a:fillRect/>
+          </a:stretch>
+        </p:blipFill>
+        <p:spPr>
+          <a:xfrm>
+            <a:off x="7071862" y="1287381"/>
+            <a:ext cx="4995193" cy="4619668"/>
+          </a:xfrm>
+          <a:prstGeom prst="rect">
+            <a:avLst/>
+          </a:prstGeom>
+        </p:spPr>
+      </p:pic>
     </p:spTree>
     <p:extLst>
       <p:ext uri="{BB962C8B-B14F-4D97-AF65-F5344CB8AC3E}">
@@ -14817,7 +14708,7 @@
       </p:grpSpPr>
       <p:pic>
         <p:nvPicPr>
-          <p:cNvPr id="2" name="Picture 1"/>
+          <p:cNvPr id="3" name="Picture 2"/>
           <p:cNvPicPr>
             <a:picLocks noChangeAspect="1"/>
           </p:cNvPicPr>
@@ -14831,19 +14722,12 @@
         </p:blipFill>
         <p:spPr>
           <a:xfrm>
-            <a:off x="658637" y="101719"/>
-            <a:ext cx="8545325" cy="6646942"/>
+            <a:off x="560388" y="195501"/>
+            <a:ext cx="9521567" cy="6518119"/>
           </a:xfrm>
           <a:prstGeom prst="rect">
             <a:avLst/>
           </a:prstGeom>
-          <a:ln>
-            <a:solidFill>
-              <a:schemeClr val="bg1">
-                <a:lumMod val="50000"/>
-              </a:schemeClr>
-            </a:solidFill>
-          </a:ln>
         </p:spPr>
       </p:pic>
       <p:sp>
@@ -14880,7 +14764,7 @@
       </p:sp>
       <p:sp>
         <p:nvSpPr>
-          <p:cNvPr id="8" name="Text Placeholder 6"/>
+          <p:cNvPr id="9" name="Text Placeholder 6"/>
           <p:cNvSpPr txBox="1">
             <a:spLocks/>
           </p:cNvSpPr>
@@ -14888,8 +14772,8 @@
         </p:nvSpPr>
         <p:spPr>
           <a:xfrm>
-            <a:off x="7676766" y="1394315"/>
-            <a:ext cx="3625818" cy="771763"/>
+            <a:off x="6408096" y="5110419"/>
+            <a:ext cx="5368978" cy="566898"/>
           </a:xfrm>
           <a:prstGeom prst="rect">
             <a:avLst/>
@@ -15146,7 +15030,7 @@
                   <a:srgbClr val="FF0000"/>
                 </a:solidFill>
               </a:rPr>
-              <a:t>Discovery service resource using </a:t>
+              <a:t>Retrieve access token using </a:t>
             </a:r>
             <a:r>
               <a:rPr lang="en-US" sz="1800" b="1" dirty="0" err="1" smtClean="0">
@@ -15154,293 +15038,7 @@
                   <a:srgbClr val="FF0000"/>
                 </a:solidFill>
               </a:rPr>
-              <a:t>DiscoverResourceAsync</a:t>
-            </a:r>
-            <a:endParaRPr lang="en-US" sz="1800" b="1" dirty="0" smtClean="0">
-              <a:solidFill>
-                <a:srgbClr val="FF0000"/>
-              </a:solidFill>
-            </a:endParaRPr>
-          </a:p>
-        </p:txBody>
-      </p:sp>
-      <p:sp>
-        <p:nvSpPr>
-          <p:cNvPr id="9" name="Text Placeholder 6"/>
-          <p:cNvSpPr txBox="1">
-            <a:spLocks/>
-          </p:cNvSpPr>
-          <p:nvPr/>
-        </p:nvSpPr>
-        <p:spPr>
-          <a:xfrm>
-            <a:off x="6468256" y="5832315"/>
-            <a:ext cx="5368978" cy="566898"/>
-          </a:xfrm>
-          <a:prstGeom prst="rect">
-            <a:avLst/>
-          </a:prstGeom>
-          <a:solidFill>
-            <a:schemeClr val="accent2">
-              <a:lumMod val="20000"/>
-              <a:lumOff val="80000"/>
-            </a:schemeClr>
-          </a:solidFill>
-          <a:ln>
-            <a:solidFill>
-              <a:schemeClr val="bg1">
-                <a:lumMod val="65000"/>
-              </a:schemeClr>
-            </a:solidFill>
-          </a:ln>
-        </p:spPr>
-        <p:txBody>
-          <a:bodyPr lIns="91440" tIns="182880" rIns="91440"/>
-          <a:lstStyle>
-            <a:lvl1pPr marL="339725" marR="0" indent="-339725" algn="l" defTabSz="914363" rtl="0" eaLnBrk="1" fontAlgn="auto" latinLnBrk="0" hangingPunct="1">
-              <a:lnSpc>
-                <a:spcPct val="90000"/>
-              </a:lnSpc>
-              <a:spcBef>
-                <a:spcPct val="20000"/>
-              </a:spcBef>
-              <a:spcAft>
-                <a:spcPts val="0"/>
-              </a:spcAft>
-              <a:buClrTx/>
-              <a:buSzPct val="80000"/>
-              <a:buFont typeface="Arial" pitchFamily="34" charset="0"/>
-              <a:buChar char="•"/>
-              <a:tabLst/>
-              <a:defRPr sz="3600" kern="1200" spc="-70" baseline="0">
-                <a:gradFill>
-                  <a:gsLst>
-                    <a:gs pos="1250">
-                      <a:schemeClr val="bg2"/>
-                    </a:gs>
-                    <a:gs pos="100000">
-                      <a:schemeClr val="bg2"/>
-                    </a:gs>
-                  </a:gsLst>
-                  <a:lin ang="5400000" scaled="0"/>
-                </a:gradFill>
-                <a:latin typeface="+mj-lt"/>
-                <a:ea typeface="+mn-ea"/>
-                <a:cs typeface="+mn-cs"/>
-              </a:defRPr>
-            </a:lvl1pPr>
-            <a:lvl2pPr marL="573088" marR="0" indent="-233363" algn="l" defTabSz="914363" rtl="0" eaLnBrk="1" fontAlgn="auto" latinLnBrk="0" hangingPunct="1">
-              <a:lnSpc>
-                <a:spcPct val="90000"/>
-              </a:lnSpc>
-              <a:spcBef>
-                <a:spcPct val="20000"/>
-              </a:spcBef>
-              <a:spcAft>
-                <a:spcPts val="0"/>
-              </a:spcAft>
-              <a:buClrTx/>
-              <a:buSzPct val="90000"/>
-              <a:buFont typeface="Wingdings" pitchFamily="2" charset="2"/>
-              <a:buChar char=""/>
-              <a:tabLst/>
-              <a:defRPr sz="2400" kern="1200" spc="0" baseline="0">
-                <a:gradFill>
-                  <a:gsLst>
-                    <a:gs pos="1250">
-                      <a:schemeClr val="bg2"/>
-                    </a:gs>
-                    <a:gs pos="100000">
-                      <a:schemeClr val="bg2"/>
-                    </a:gs>
-                  </a:gsLst>
-                  <a:lin ang="5400000" scaled="0"/>
-                </a:gradFill>
-                <a:latin typeface="+mn-lt"/>
-                <a:ea typeface="+mn-ea"/>
-                <a:cs typeface="+mn-cs"/>
-              </a:defRPr>
-            </a:lvl2pPr>
-            <a:lvl3pPr marL="798513" marR="0" indent="-225425" algn="l" defTabSz="914363" rtl="0" eaLnBrk="1" fontAlgn="auto" latinLnBrk="0" hangingPunct="1">
-              <a:lnSpc>
-                <a:spcPct val="90000"/>
-              </a:lnSpc>
-              <a:spcBef>
-                <a:spcPct val="20000"/>
-              </a:spcBef>
-              <a:spcAft>
-                <a:spcPts val="0"/>
-              </a:spcAft>
-              <a:buClrTx/>
-              <a:buSzPct val="90000"/>
-              <a:buFont typeface="Wingdings" pitchFamily="2" charset="2"/>
-              <a:buChar char=""/>
-              <a:tabLst>
-                <a:tab pos="798513" algn="l"/>
-              </a:tabLst>
-              <a:defRPr sz="2400" kern="1200" spc="0" baseline="0">
-                <a:gradFill>
-                  <a:gsLst>
-                    <a:gs pos="1250">
-                      <a:schemeClr val="bg2"/>
-                    </a:gs>
-                    <a:gs pos="100000">
-                      <a:schemeClr val="bg2"/>
-                    </a:gs>
-                  </a:gsLst>
-                  <a:lin ang="5400000" scaled="0"/>
-                </a:gradFill>
-                <a:latin typeface="+mn-lt"/>
-                <a:ea typeface="+mn-ea"/>
-                <a:cs typeface="+mn-cs"/>
-              </a:defRPr>
-            </a:lvl3pPr>
-            <a:lvl4pPr marL="1030288" marR="0" indent="-231775" algn="l" defTabSz="914363" rtl="0" eaLnBrk="1" fontAlgn="auto" latinLnBrk="0" hangingPunct="1">
-              <a:lnSpc>
-                <a:spcPct val="90000"/>
-              </a:lnSpc>
-              <a:spcBef>
-                <a:spcPct val="20000"/>
-              </a:spcBef>
-              <a:spcAft>
-                <a:spcPts val="0"/>
-              </a:spcAft>
-              <a:buClrTx/>
-              <a:buSzPct val="90000"/>
-              <a:buFont typeface="Wingdings" pitchFamily="2" charset="2"/>
-              <a:buChar char=""/>
-              <a:tabLst/>
-              <a:defRPr sz="2000" kern="1200" spc="0" baseline="0">
-                <a:gradFill>
-                  <a:gsLst>
-                    <a:gs pos="1250">
-                      <a:schemeClr val="bg2"/>
-                    </a:gs>
-                    <a:gs pos="100000">
-                      <a:schemeClr val="bg2"/>
-                    </a:gs>
-                  </a:gsLst>
-                  <a:lin ang="5400000" scaled="0"/>
-                </a:gradFill>
-                <a:latin typeface="+mn-lt"/>
-                <a:ea typeface="+mn-ea"/>
-                <a:cs typeface="+mn-cs"/>
-              </a:defRPr>
-            </a:lvl4pPr>
-            <a:lvl5pPr marL="1255713" marR="0" indent="-225425" algn="l" defTabSz="914363" rtl="0" eaLnBrk="1" fontAlgn="auto" latinLnBrk="0" hangingPunct="1">
-              <a:lnSpc>
-                <a:spcPct val="90000"/>
-              </a:lnSpc>
-              <a:spcBef>
-                <a:spcPct val="20000"/>
-              </a:spcBef>
-              <a:spcAft>
-                <a:spcPts val="0"/>
-              </a:spcAft>
-              <a:buClrTx/>
-              <a:buSzPct val="90000"/>
-              <a:buFont typeface="Wingdings" pitchFamily="2" charset="2"/>
-              <a:buChar char=""/>
-              <a:tabLst>
-                <a:tab pos="1255713" algn="l"/>
-              </a:tabLst>
-              <a:defRPr sz="2000" kern="1200" spc="0" baseline="0">
-                <a:gradFill>
-                  <a:gsLst>
-                    <a:gs pos="1250">
-                      <a:schemeClr val="bg2"/>
-                    </a:gs>
-                    <a:gs pos="100000">
-                      <a:schemeClr val="bg2"/>
-                    </a:gs>
-                  </a:gsLst>
-                  <a:lin ang="5400000" scaled="0"/>
-                </a:gradFill>
-                <a:latin typeface="+mn-lt"/>
-                <a:ea typeface="+mn-ea"/>
-                <a:cs typeface="+mn-cs"/>
-              </a:defRPr>
-            </a:lvl5pPr>
-            <a:lvl6pPr marL="2514499" indent="-228591" algn="l" defTabSz="914363" rtl="0" eaLnBrk="1" latinLnBrk="0" hangingPunct="1">
-              <a:spcBef>
-                <a:spcPct val="20000"/>
-              </a:spcBef>
-              <a:buFont typeface="Arial" pitchFamily="34" charset="0"/>
-              <a:buChar char="•"/>
-              <a:defRPr sz="2000" kern="1200">
-                <a:solidFill>
-                  <a:schemeClr val="tx1"/>
-                </a:solidFill>
-                <a:latin typeface="+mn-lt"/>
-                <a:ea typeface="+mn-ea"/>
-                <a:cs typeface="+mn-cs"/>
-              </a:defRPr>
-            </a:lvl6pPr>
-            <a:lvl7pPr marL="2971681" indent="-228591" algn="l" defTabSz="914363" rtl="0" eaLnBrk="1" latinLnBrk="0" hangingPunct="1">
-              <a:spcBef>
-                <a:spcPct val="20000"/>
-              </a:spcBef>
-              <a:buFont typeface="Arial" pitchFamily="34" charset="0"/>
-              <a:buChar char="•"/>
-              <a:defRPr sz="2000" kern="1200">
-                <a:solidFill>
-                  <a:schemeClr val="tx1"/>
-                </a:solidFill>
-                <a:latin typeface="+mn-lt"/>
-                <a:ea typeface="+mn-ea"/>
-                <a:cs typeface="+mn-cs"/>
-              </a:defRPr>
-            </a:lvl7pPr>
-            <a:lvl8pPr marL="3428863" indent="-228591" algn="l" defTabSz="914363" rtl="0" eaLnBrk="1" latinLnBrk="0" hangingPunct="1">
-              <a:spcBef>
-                <a:spcPct val="20000"/>
-              </a:spcBef>
-              <a:buFont typeface="Arial" pitchFamily="34" charset="0"/>
-              <a:buChar char="•"/>
-              <a:defRPr sz="2000" kern="1200">
-                <a:solidFill>
-                  <a:schemeClr val="tx1"/>
-                </a:solidFill>
-                <a:latin typeface="+mn-lt"/>
-                <a:ea typeface="+mn-ea"/>
-                <a:cs typeface="+mn-cs"/>
-              </a:defRPr>
-            </a:lvl8pPr>
-            <a:lvl9pPr marL="3886045" indent="-228591" algn="l" defTabSz="914363" rtl="0" eaLnBrk="1" latinLnBrk="0" hangingPunct="1">
-              <a:spcBef>
-                <a:spcPct val="20000"/>
-              </a:spcBef>
-              <a:buFont typeface="Arial" pitchFamily="34" charset="0"/>
-              <a:buChar char="•"/>
-              <a:defRPr sz="2000" kern="1200">
-                <a:solidFill>
-                  <a:schemeClr val="tx1"/>
-                </a:solidFill>
-                <a:latin typeface="+mn-lt"/>
-                <a:ea typeface="+mn-ea"/>
-                <a:cs typeface="+mn-cs"/>
-              </a:defRPr>
-            </a:lvl9pPr>
-          </a:lstStyle>
-          <a:p>
-            <a:pPr marL="0" indent="0">
-              <a:buNone/>
-            </a:pPr>
-            <a:r>
-              <a:rPr lang="en-US" sz="1800" dirty="0" smtClean="0">
-                <a:solidFill>
-                  <a:srgbClr val="FF0000"/>
-                </a:solidFill>
-              </a:rPr>
-              <a:t>Retrieve access token using </a:t>
-            </a:r>
-            <a:r>
-              <a:rPr lang="en-US" sz="1800" b="1" dirty="0" err="1" smtClean="0">
-                <a:solidFill>
-                  <a:srgbClr val="FF0000"/>
-                </a:solidFill>
-              </a:rPr>
-              <a:t>AcquireAccessTokenSlientAsync</a:t>
+              <a:t>AcquireTokenSlientAsync</a:t>
             </a:r>
             <a:endParaRPr lang="en-US" sz="1800" b="1" dirty="0">
               <a:solidFill>
@@ -15450,45 +15048,6 @@
           </a:p>
         </p:txBody>
       </p:sp>
-      <p:cxnSp>
-        <p:nvCxnSpPr>
-          <p:cNvPr id="11" name="Straight Arrow Connector 10"/>
-          <p:cNvCxnSpPr>
-            <a:stCxn id="8" idx="1"/>
-          </p:cNvCxnSpPr>
-          <p:nvPr/>
-        </p:nvCxnSpPr>
-        <p:spPr>
-          <a:xfrm flipH="1">
-            <a:off x="6468256" y="1780197"/>
-            <a:ext cx="1208510" cy="595744"/>
-          </a:xfrm>
-          <a:prstGeom prst="straightConnector1">
-            <a:avLst/>
-          </a:prstGeom>
-          <a:ln>
-            <a:solidFill>
-              <a:schemeClr val="tx1"/>
-            </a:solidFill>
-            <a:headEnd type="none"/>
-            <a:tailEnd type="triangle"/>
-          </a:ln>
-        </p:spPr>
-        <p:style>
-          <a:lnRef idx="1">
-            <a:schemeClr val="accent1"/>
-          </a:lnRef>
-          <a:fillRef idx="0">
-            <a:schemeClr val="accent1"/>
-          </a:fillRef>
-          <a:effectRef idx="0">
-            <a:schemeClr val="accent1"/>
-          </a:effectRef>
-          <a:fontRef idx="minor">
-            <a:schemeClr val="tx1"/>
-          </a:fontRef>
-        </p:style>
-      </p:cxnSp>
       <p:cxnSp>
         <p:nvCxnSpPr>
           <p:cNvPr id="13" name="Straight Arrow Connector 12"/>
@@ -15497,8 +15056,8 @@
         </p:nvCxnSpPr>
         <p:spPr>
           <a:xfrm flipH="1" flipV="1">
-            <a:off x="5433934" y="5329003"/>
-            <a:ext cx="944381" cy="839449"/>
+            <a:off x="4872789" y="4074116"/>
+            <a:ext cx="3803556" cy="997207"/>
           </a:xfrm>
           <a:prstGeom prst="straightConnector1">
             <a:avLst/>
@@ -15576,7 +15135,11 @@
           <a:p>
             <a:r>
               <a:rPr lang="en-US" dirty="0" smtClean="0"/>
-              <a:t>Programming with ExchangeClient</a:t>
+              <a:t>Programming with </a:t>
+            </a:r>
+            <a:r>
+              <a:rPr lang="en-US" dirty="0" err="1" smtClean="0"/>
+              <a:t>OutlookServiceClient</a:t>
             </a:r>
             <a:endParaRPr lang="en-US" dirty="0"/>
           </a:p>
@@ -15603,8 +15166,12 @@
           <a:lstStyle/>
           <a:p>
             <a:r>
+              <a:rPr lang="en-US" dirty="0" err="1" smtClean="0"/>
+              <a:t>OutlookServiceClient</a:t>
+            </a:r>
+            <a:r>
               <a:rPr lang="en-US" dirty="0" smtClean="0"/>
-              <a:t>ExchangeClient provide </a:t>
+              <a:t> provide </a:t>
             </a:r>
             <a:r>
               <a:rPr lang="en-US" b="1" dirty="0" smtClean="0"/>
@@ -15675,32 +15242,26 @@
       </p:sp>
       <p:pic>
         <p:nvPicPr>
-          <p:cNvPr id="4" name="Picture 3"/>
+          <p:cNvPr id="6" name="Picture 5"/>
           <p:cNvPicPr>
             <a:picLocks noChangeAspect="1"/>
           </p:cNvPicPr>
           <p:nvPr/>
         </p:nvPicPr>
-        <p:blipFill rotWithShape="1">
+        <p:blipFill>
           <a:blip r:embed="rId3"/>
-          <a:srcRect r="38232"/>
-          <a:stretch/>
+          <a:stretch>
+            <a:fillRect/>
+          </a:stretch>
         </p:blipFill>
         <p:spPr>
           <a:xfrm>
-            <a:off x="1081386" y="3061698"/>
-            <a:ext cx="10234169" cy="2131574"/>
+            <a:off x="1018685" y="3236811"/>
+            <a:ext cx="10151455" cy="2153339"/>
           </a:xfrm>
           <a:prstGeom prst="rect">
             <a:avLst/>
           </a:prstGeom>
-          <a:ln>
-            <a:solidFill>
-              <a:schemeClr val="bg1">
-                <a:lumMod val="50000"/>
-              </a:schemeClr>
-            </a:solidFill>
-          </a:ln>
         </p:spPr>
       </p:pic>
     </p:spTree>
@@ -15785,7 +15346,7 @@
       </p:sp>
       <p:pic>
         <p:nvPicPr>
-          <p:cNvPr id="7" name="Picture 6"/>
+          <p:cNvPr id="5" name="Picture 4"/>
           <p:cNvPicPr>
             <a:picLocks noChangeAspect="1"/>
           </p:cNvPicPr>
@@ -15799,29 +15360,17 @@
         </p:blipFill>
         <p:spPr>
           <a:xfrm>
-            <a:off x="519112" y="1440127"/>
-            <a:ext cx="6296025" cy="4495800"/>
+            <a:off x="519112" y="1085668"/>
+            <a:ext cx="6797133" cy="5302727"/>
           </a:xfrm>
           <a:prstGeom prst="rect">
             <a:avLst/>
           </a:prstGeom>
-          <a:solidFill>
-            <a:schemeClr val="bg1">
-              <a:lumMod val="50000"/>
-            </a:schemeClr>
-          </a:solidFill>
-          <a:ln>
-            <a:solidFill>
-              <a:schemeClr val="bg1">
-                <a:lumMod val="50000"/>
-              </a:schemeClr>
-            </a:solidFill>
-          </a:ln>
         </p:spPr>
       </p:pic>
       <p:pic>
         <p:nvPicPr>
-          <p:cNvPr id="6" name="Picture 5"/>
+          <p:cNvPr id="3" name="Picture 2"/>
           <p:cNvPicPr>
             <a:picLocks noChangeAspect="1"/>
           </p:cNvPicPr>
@@ -15835,19 +15384,12 @@
         </p:blipFill>
         <p:spPr>
           <a:xfrm>
-            <a:off x="5014288" y="3373891"/>
-            <a:ext cx="4276725" cy="3000375"/>
+            <a:off x="7201458" y="903736"/>
+            <a:ext cx="4466667" cy="4809524"/>
           </a:xfrm>
           <a:prstGeom prst="rect">
             <a:avLst/>
           </a:prstGeom>
-          <a:ln>
-            <a:solidFill>
-              <a:schemeClr val="bg1">
-                <a:lumMod val="50000"/>
-              </a:schemeClr>
-            </a:solidFill>
-          </a:ln>
         </p:spPr>
       </p:pic>
     </p:spTree>
@@ -17223,7 +16765,7 @@
                 <a:gridCol w="5760278">
                   <a:extLst>
                     <a:ext uri="{9D8B030D-6E8A-4147-A177-3AD203B41FA5}">
-                      <a16:colId xmlns:a16="http://schemas.microsoft.com/office/drawing/2014/main" val="1253488153"/>
+                      <a16:colId xmlns="" xmlns:a16="http://schemas.microsoft.com/office/drawing/2014/main" val="1253488153"/>
                     </a:ext>
                   </a:extLst>
                 </a:gridCol>
@@ -17249,7 +16791,7 @@
                 </a:tc>
                 <a:extLst>
                   <a:ext uri="{0D108BD9-81ED-4DB2-BD59-A6C34878D82A}">
-                    <a16:rowId xmlns:a16="http://schemas.microsoft.com/office/drawing/2014/main" val="829859176"/>
+                    <a16:rowId xmlns="" xmlns:a16="http://schemas.microsoft.com/office/drawing/2014/main" val="829859176"/>
                   </a:ext>
                 </a:extLst>
               </a:tr>
@@ -17261,11 +16803,7 @@
                     <a:p>
                       <a:r>
                         <a:rPr lang="en-US" sz="1800" b="0" dirty="0" smtClean="0"/>
-                        <a:t>Module 1: </a:t>
-                      </a:r>
-                      <a:r>
-                        <a:rPr lang="en-US" sz="1800" b="0" dirty="0" smtClean="0"/>
-                        <a:t>Introduction</a:t>
+                        <a:t>Module 1: Introduction</a:t>
                       </a:r>
                       <a:r>
                         <a:rPr lang="en-US" sz="1800" b="0" baseline="0" dirty="0" smtClean="0"/>
@@ -17278,7 +16816,7 @@
                 </a:tc>
                 <a:extLst>
                   <a:ext uri="{0D108BD9-81ED-4DB2-BD59-A6C34878D82A}">
-                    <a16:rowId xmlns:a16="http://schemas.microsoft.com/office/drawing/2014/main" val="1946132611"/>
+                    <a16:rowId xmlns="" xmlns:a16="http://schemas.microsoft.com/office/drawing/2014/main" val="1946132611"/>
                   </a:ext>
                 </a:extLst>
               </a:tr>
@@ -17311,11 +16849,7 @@
                       </a:r>
                       <a:r>
                         <a:rPr lang="en-US" sz="1800" b="0" baseline="0" dirty="0" smtClean="0"/>
-                        <a:t> </a:t>
-                      </a:r>
-                      <a:r>
-                        <a:rPr lang="en-US" sz="1800" b="0" baseline="0" dirty="0" smtClean="0"/>
-                        <a:t>Office</a:t>
+                        <a:t> Office</a:t>
                       </a:r>
                       <a:endParaRPr lang="en-US" sz="1800" b="0" dirty="0" smtClean="0"/>
                     </a:p>
@@ -17324,7 +16858,7 @@
                 </a:tc>
                 <a:extLst>
                   <a:ext uri="{0D108BD9-81ED-4DB2-BD59-A6C34878D82A}">
-                    <a16:rowId xmlns:a16="http://schemas.microsoft.com/office/drawing/2014/main" val="3204002662"/>
+                    <a16:rowId xmlns="" xmlns:a16="http://schemas.microsoft.com/office/drawing/2014/main" val="3204002662"/>
                   </a:ext>
                 </a:extLst>
               </a:tr>
@@ -17355,14 +16889,13 @@
                         <a:rPr lang="en-US" sz="1800" b="0" dirty="0" smtClean="0"/>
                         <a:t>Module 3: Getting started with Apps for SharePoint</a:t>
                       </a:r>
-                      <a:endParaRPr lang="en-US" sz="1800" b="0" dirty="0" smtClean="0"/>
                     </a:p>
                   </a:txBody>
                   <a:tcPr marL="67371" marR="67371" marT="33685" marB="33685" anchor="ctr"/>
                 </a:tc>
                 <a:extLst>
                   <a:ext uri="{0D108BD9-81ED-4DB2-BD59-A6C34878D82A}">
-                    <a16:rowId xmlns:a16="http://schemas.microsoft.com/office/drawing/2014/main" val="3774542436"/>
+                    <a16:rowId xmlns="" xmlns:a16="http://schemas.microsoft.com/office/drawing/2014/main" val="3774542436"/>
                   </a:ext>
                 </a:extLst>
               </a:tr>
@@ -17414,7 +16947,7 @@
                 </a:tc>
                 <a:extLst>
                   <a:ext uri="{0D108BD9-81ED-4DB2-BD59-A6C34878D82A}">
-                    <a16:rowId xmlns:a16="http://schemas.microsoft.com/office/drawing/2014/main" val="4266278162"/>
+                    <a16:rowId xmlns="" xmlns:a16="http://schemas.microsoft.com/office/drawing/2014/main" val="4266278162"/>
                   </a:ext>
                 </a:extLst>
               </a:tr>
@@ -17451,7 +16984,7 @@
                 </a:tc>
                 <a:extLst>
                   <a:ext uri="{0D108BD9-81ED-4DB2-BD59-A6C34878D82A}">
-                    <a16:rowId xmlns:a16="http://schemas.microsoft.com/office/drawing/2014/main" val="1208832343"/>
+                    <a16:rowId xmlns="" xmlns:a16="http://schemas.microsoft.com/office/drawing/2014/main" val="1208832343"/>
                   </a:ext>
                 </a:extLst>
               </a:tr>
@@ -18013,7 +17546,7 @@
       </p:grpSpPr>
       <p:pic>
         <p:nvPicPr>
-          <p:cNvPr id="9" name="Picture 8"/>
+          <p:cNvPr id="6" name="Picture 5"/>
           <p:cNvPicPr>
             <a:picLocks noChangeAspect="1"/>
           </p:cNvPicPr>
@@ -18027,19 +17560,12 @@
         </p:blipFill>
         <p:spPr>
           <a:xfrm>
-            <a:off x="931409" y="2396823"/>
-            <a:ext cx="7875347" cy="3531366"/>
+            <a:off x="1081386" y="2219013"/>
+            <a:ext cx="7371428" cy="4400000"/>
           </a:xfrm>
           <a:prstGeom prst="rect">
             <a:avLst/>
           </a:prstGeom>
-          <a:ln>
-            <a:solidFill>
-              <a:schemeClr val="bg1">
-                <a:lumMod val="50000"/>
-              </a:schemeClr>
-            </a:solidFill>
-          </a:ln>
         </p:spPr>
       </p:pic>
       <p:sp>
@@ -18163,22 +17689,27 @@
       </p:sp>
       <p:pic>
         <p:nvPicPr>
-          <p:cNvPr id="7" name="Picture 6"/>
+          <p:cNvPr id="5" name="Picture 4"/>
           <p:cNvPicPr>
             <a:picLocks noChangeAspect="1"/>
           </p:cNvPicPr>
           <p:nvPr/>
         </p:nvPicPr>
-        <p:blipFill>
-          <a:blip r:embed="rId3"/>
-          <a:stretch>
-            <a:fillRect/>
-          </a:stretch>
+        <p:blipFill rotWithShape="1">
+          <a:blip r:embed="rId3">
+            <a:extLst>
+              <a:ext uri="{28A0092B-C50C-407E-A947-70E740481C1C}">
+                <a14:useLocalDpi xmlns:a14="http://schemas.microsoft.com/office/drawing/2010/main" val="0"/>
+              </a:ext>
+            </a:extLst>
+          </a:blip>
+          <a:srcRect t="9366"/>
+          <a:stretch/>
         </p:blipFill>
         <p:spPr>
           <a:xfrm>
-            <a:off x="5221053" y="4361878"/>
-            <a:ext cx="2564291" cy="1978682"/>
+            <a:off x="7948499" y="4358853"/>
+            <a:ext cx="3670044" cy="1650905"/>
           </a:xfrm>
           <a:prstGeom prst="rect">
             <a:avLst/>
@@ -18194,38 +17725,26 @@
       </p:pic>
       <p:pic>
         <p:nvPicPr>
-          <p:cNvPr id="5" name="Picture 4"/>
+          <p:cNvPr id="8" name="Picture 7"/>
           <p:cNvPicPr>
             <a:picLocks noChangeAspect="1"/>
           </p:cNvPicPr>
           <p:nvPr/>
         </p:nvPicPr>
-        <p:blipFill rotWithShape="1">
-          <a:blip r:embed="rId4">
-            <a:extLst>
-              <a:ext uri="{28A0092B-C50C-407E-A947-70E740481C1C}">
-                <a14:useLocalDpi xmlns:a14="http://schemas.microsoft.com/office/drawing/2010/main" val="0"/>
-              </a:ext>
-            </a:extLst>
-          </a:blip>
-          <a:srcRect t="9366"/>
-          <a:stretch/>
+        <p:blipFill>
+          <a:blip r:embed="rId4"/>
+          <a:stretch>
+            <a:fillRect/>
+          </a:stretch>
         </p:blipFill>
         <p:spPr>
           <a:xfrm>
-            <a:off x="8196609" y="3700314"/>
-            <a:ext cx="3670044" cy="1650905"/>
+            <a:off x="7083165" y="2100736"/>
+            <a:ext cx="1930335" cy="2089721"/>
           </a:xfrm>
           <a:prstGeom prst="rect">
             <a:avLst/>
           </a:prstGeom>
-          <a:ln>
-            <a:solidFill>
-              <a:schemeClr val="bg1">
-                <a:lumMod val="50000"/>
-              </a:schemeClr>
-            </a:solidFill>
-          </a:ln>
         </p:spPr>
       </p:pic>
     </p:spTree>
@@ -18547,7 +18066,7 @@
       </p:sp>
       <p:pic>
         <p:nvPicPr>
-          <p:cNvPr id="5" name="Picture 4"/>
+          <p:cNvPr id="6" name="Picture 5"/>
           <p:cNvPicPr>
             <a:picLocks noChangeAspect="1"/>
           </p:cNvPicPr>
@@ -18555,37 +18074,6 @@
         </p:nvPicPr>
         <p:blipFill>
           <a:blip r:embed="rId2"/>
-          <a:stretch>
-            <a:fillRect/>
-          </a:stretch>
-        </p:blipFill>
-        <p:spPr>
-          <a:xfrm>
-            <a:off x="901039" y="2072008"/>
-            <a:ext cx="4838700" cy="2200275"/>
-          </a:xfrm>
-          <a:prstGeom prst="rect">
-            <a:avLst/>
-          </a:prstGeom>
-          <a:ln>
-            <a:solidFill>
-              <a:schemeClr val="bg1">
-                <a:lumMod val="50000"/>
-              </a:schemeClr>
-            </a:solidFill>
-          </a:ln>
-        </p:spPr>
-      </p:pic>
-      <p:pic>
-        <p:nvPicPr>
-          <p:cNvPr id="6" name="Picture 5"/>
-          <p:cNvPicPr>
-            <a:picLocks noChangeAspect="1"/>
-          </p:cNvPicPr>
-          <p:nvPr/>
-        </p:nvPicPr>
-        <p:blipFill>
-          <a:blip r:embed="rId3"/>
           <a:stretch>
             <a:fillRect/>
           </a:stretch>
@@ -18605,6 +18093,30 @@
               </a:schemeClr>
             </a:solidFill>
           </a:ln>
+        </p:spPr>
+      </p:pic>
+      <p:pic>
+        <p:nvPicPr>
+          <p:cNvPr id="8" name="Picture 7"/>
+          <p:cNvPicPr>
+            <a:picLocks noChangeAspect="1"/>
+          </p:cNvPicPr>
+          <p:nvPr/>
+        </p:nvPicPr>
+        <p:blipFill>
+          <a:blip r:embed="rId3"/>
+          <a:stretch>
+            <a:fillRect/>
+          </a:stretch>
+        </p:blipFill>
+        <p:spPr>
+          <a:xfrm>
+            <a:off x="863115" y="1911497"/>
+            <a:ext cx="6680686" cy="2434116"/>
+          </a:xfrm>
+          <a:prstGeom prst="rect">
+            <a:avLst/>
+          </a:prstGeom>
         </p:spPr>
       </p:pic>
     </p:spTree>
@@ -18757,7 +18269,7 @@
       </p:pic>
       <p:pic>
         <p:nvPicPr>
-          <p:cNvPr id="6" name="Picture 5"/>
+          <p:cNvPr id="7" name="Picture 6"/>
           <p:cNvPicPr>
             <a:picLocks noChangeAspect="1"/>
           </p:cNvPicPr>
@@ -18771,19 +18283,12 @@
         </p:blipFill>
         <p:spPr>
           <a:xfrm>
-            <a:off x="893977" y="2469617"/>
-            <a:ext cx="5811544" cy="2136597"/>
+            <a:off x="1081385" y="2101021"/>
+            <a:ext cx="5523951" cy="4653445"/>
           </a:xfrm>
           <a:prstGeom prst="rect">
             <a:avLst/>
           </a:prstGeom>
-          <a:ln>
-            <a:solidFill>
-              <a:schemeClr val="bg1">
-                <a:lumMod val="50000"/>
-              </a:schemeClr>
-            </a:solidFill>
-          </a:ln>
         </p:spPr>
       </p:pic>
     </p:spTree>
@@ -19028,15 +18533,25 @@
             <p:ph type="body" sz="quarter" idx="10"/>
           </p:nvPr>
         </p:nvSpPr>
-        <p:spPr/>
+        <p:spPr>
+          <a:xfrm>
+            <a:off x="554414" y="1459832"/>
+            <a:ext cx="11152188" cy="1988237"/>
+          </a:xfrm>
+        </p:spPr>
         <p:txBody>
           <a:bodyPr/>
           <a:lstStyle/>
           <a:p>
             <a:r>
               <a:rPr lang="en-GB" sz="1800" dirty="0"/>
-              <a:t>https://outlook.office365.com/ews/odata/Me/RootFolder </a:t>
-            </a:r>
+              <a:t>https://</a:t>
+            </a:r>
+            <a:r>
+              <a:rPr lang="en-GB" sz="1800" dirty="0" smtClean="0"/>
+              <a:t>outlook.office365.com/api/v1.0/me/rootFolder </a:t>
+            </a:r>
+            <a:endParaRPr lang="en-GB" sz="1800" dirty="0"/>
           </a:p>
           <a:p>
             <a:r>
@@ -19049,7 +18564,7 @@
             </a:r>
             <a:r>
               <a:rPr lang="en-GB" sz="1800" dirty="0" smtClean="0"/>
-              <a:t>outlook.office365.com/ews/odata/Me/Inbox</a:t>
+              <a:t>outlook.office365.com/api/v1.0/me/messages</a:t>
             </a:r>
           </a:p>
           <a:p>
@@ -19059,7 +18574,7 @@
             </a:r>
             <a:r>
               <a:rPr lang="en-GB" sz="1800" dirty="0" smtClean="0"/>
-              <a:t>outlook.office365.com/ews/odata/Me/Inbox(</a:t>
+              <a:t>outlook.office365.com/api/v1.0/me/folders/</a:t>
             </a:r>
             <a:r>
               <a:rPr lang="en-GB" sz="1800" dirty="0" smtClean="0">
@@ -19069,30 +18584,30 @@
                   </a:schemeClr>
                 </a:solidFill>
               </a:rPr>
-              <a:t>&lt;message_id&gt;</a:t>
+              <a:t>&lt;folder_id&gt;/</a:t>
             </a:r>
             <a:r>
               <a:rPr lang="en-GB" sz="1800" dirty="0" smtClean="0"/>
-              <a:t>)</a:t>
+              <a:t>messages</a:t>
             </a:r>
             <a:endParaRPr lang="en-GB" sz="1800" dirty="0"/>
           </a:p>
           <a:p>
             <a:r>
               <a:rPr lang="en-GB" sz="1800" dirty="0" smtClean="0"/>
-              <a:t>https://outlook.office365.com/ews/odata/Me/Drafts </a:t>
+              <a:t>https://outlook.office365.com/api/v1.0/me/folders/drafts </a:t>
             </a:r>
           </a:p>
           <a:p>
             <a:r>
               <a:rPr lang="en-GB" sz="1800" dirty="0" smtClean="0"/>
-              <a:t>https://outlook.office365.com/ews/odata/Me/SentItems </a:t>
+              <a:t>https://outlook.office365.com/api/v1.0/me/folders/sentitems </a:t>
             </a:r>
           </a:p>
           <a:p>
             <a:r>
               <a:rPr lang="en-GB" sz="1800" dirty="0" smtClean="0"/>
-              <a:t>https://outlook.office365.com/ews/odata/Me/DeletedItems</a:t>
+              <a:t>https://outlook.office365.com/api/v1.0/me/folders/deleteditems</a:t>
             </a:r>
           </a:p>
           <a:p>
@@ -19109,7 +18624,19 @@
             </a:r>
             <a:r>
               <a:rPr lang="en-US" sz="1800" dirty="0" smtClean="0"/>
-              <a:t>outlook.office365.com/ews/odata/Me/Events</a:t>
+              <a:t>outlook.office365.com/</a:t>
+            </a:r>
+            <a:r>
+              <a:rPr lang="en-GB" sz="1800" dirty="0" err="1"/>
+              <a:t>api</a:t>
+            </a:r>
+            <a:r>
+              <a:rPr lang="en-GB" sz="1800" dirty="0"/>
+              <a:t>/v1.0/m</a:t>
+            </a:r>
+            <a:r>
+              <a:rPr lang="en-US" sz="1800" dirty="0" smtClean="0"/>
+              <a:t>e/events</a:t>
             </a:r>
           </a:p>
           <a:p>
@@ -19119,7 +18646,19 @@
             </a:r>
             <a:r>
               <a:rPr lang="en-US" sz="1800" dirty="0" smtClean="0"/>
-              <a:t>outlook.office365.com/ews/odata/Me/Events(</a:t>
+              <a:t>outlook.office365.com/</a:t>
+            </a:r>
+            <a:r>
+              <a:rPr lang="en-GB" sz="1800" dirty="0" err="1"/>
+              <a:t>api</a:t>
+            </a:r>
+            <a:r>
+              <a:rPr lang="en-GB" sz="1800" dirty="0"/>
+              <a:t>/v1.0/m</a:t>
+            </a:r>
+            <a:r>
+              <a:rPr lang="en-US" sz="1800" dirty="0" smtClean="0"/>
+              <a:t>e/events(</a:t>
             </a:r>
             <a:r>
               <a:rPr lang="en-US" sz="1800" dirty="0" smtClean="0">
@@ -19144,8 +18683,25 @@
             </a:r>
             <a:r>
               <a:rPr lang="en-US" sz="1800" dirty="0"/>
-              <a:t>://outlook.office365.com/ews/odata/Me/Calendar</a:t>
-            </a:r>
+              <a:t>://</a:t>
+            </a:r>
+            <a:r>
+              <a:rPr lang="en-US" sz="1800" dirty="0" smtClean="0"/>
+              <a:t>outlook.office365.com/</a:t>
+            </a:r>
+            <a:r>
+              <a:rPr lang="en-GB" sz="1800" dirty="0" err="1"/>
+              <a:t>api</a:t>
+            </a:r>
+            <a:r>
+              <a:rPr lang="en-GB" sz="1800" dirty="0"/>
+              <a:t>/v1.0/m</a:t>
+            </a:r>
+            <a:r>
+              <a:rPr lang="en-US" sz="1800" dirty="0" smtClean="0"/>
+              <a:t>e/calendar</a:t>
+            </a:r>
+            <a:endParaRPr lang="en-US" sz="1800" dirty="0"/>
           </a:p>
           <a:p>
             <a:r>
@@ -19154,8 +18710,25 @@
             </a:r>
             <a:r>
               <a:rPr lang="en-US" sz="1800" dirty="0"/>
-              <a:t>://outlook.office365.com/ews/odata/Me/Calendar/Events</a:t>
-            </a:r>
+              <a:t>://</a:t>
+            </a:r>
+            <a:r>
+              <a:rPr lang="en-US" sz="1800" dirty="0" smtClean="0"/>
+              <a:t>outlook.office365.com/</a:t>
+            </a:r>
+            <a:r>
+              <a:rPr lang="en-GB" sz="1800" dirty="0" err="1"/>
+              <a:t>api</a:t>
+            </a:r>
+            <a:r>
+              <a:rPr lang="en-GB" sz="1800" dirty="0"/>
+              <a:t>/v1.0/m</a:t>
+            </a:r>
+            <a:r>
+              <a:rPr lang="en-US" sz="1800" dirty="0" smtClean="0"/>
+              <a:t>e/calendar/events</a:t>
+            </a:r>
+            <a:endParaRPr lang="en-US" sz="1800" dirty="0"/>
           </a:p>
           <a:p>
             <a:r>
@@ -19164,7 +18737,27 @@
             </a:r>
             <a:r>
               <a:rPr lang="en-US" sz="1800" dirty="0"/>
-              <a:t>://outlook.office365.com/ews/odata/Me/Calendars(</a:t>
+              <a:t>://</a:t>
+            </a:r>
+            <a:r>
+              <a:rPr lang="en-US" sz="1800" dirty="0" smtClean="0"/>
+              <a:t>outlook.office365.com/</a:t>
+            </a:r>
+            <a:r>
+              <a:rPr lang="en-GB" sz="1800" dirty="0" err="1"/>
+              <a:t>api</a:t>
+            </a:r>
+            <a:r>
+              <a:rPr lang="en-GB" sz="1800" dirty="0"/>
+              <a:t>/v1.0/m</a:t>
+            </a:r>
+            <a:r>
+              <a:rPr lang="en-US" sz="1800" dirty="0" smtClean="0"/>
+              <a:t>e/calendars</a:t>
+            </a:r>
+            <a:r>
+              <a:rPr lang="en-US" sz="1800" dirty="0"/>
+              <a:t>(</a:t>
             </a:r>
             <a:r>
               <a:rPr lang="en-US" sz="1800" dirty="0">
@@ -19174,11 +18767,31 @@
                   </a:schemeClr>
                 </a:solidFill>
               </a:rPr>
-              <a:t>&lt;calendar_id&gt;</a:t>
-            </a:r>
-            <a:r>
-              <a:rPr lang="en-US" sz="1800" dirty="0"/>
-              <a:t>)/Events</a:t>
+              <a:t>&lt;</a:t>
+            </a:r>
+            <a:r>
+              <a:rPr lang="en-US" sz="1800" dirty="0" err="1">
+                <a:solidFill>
+                  <a:schemeClr val="bg1">
+                    <a:lumMod val="50000"/>
+                  </a:schemeClr>
+                </a:solidFill>
+              </a:rPr>
+              <a:t>calendar_id</a:t>
+            </a:r>
+            <a:r>
+              <a:rPr lang="en-US" sz="1800" dirty="0" smtClean="0">
+                <a:solidFill>
+                  <a:schemeClr val="bg1">
+                    <a:lumMod val="50000"/>
+                  </a:schemeClr>
+                </a:solidFill>
+              </a:rPr>
+              <a:t>&gt;</a:t>
+            </a:r>
+            <a:r>
+              <a:rPr lang="en-US" sz="1800" dirty="0" smtClean="0"/>
+              <a:t>)/events</a:t>
             </a:r>
             <a:endParaRPr lang="en-GB" sz="1800" dirty="0"/>
           </a:p>
@@ -19192,8 +18805,25 @@
             </a:r>
             <a:r>
               <a:rPr lang="en-US" sz="1800" dirty="0"/>
-              <a:t>://outlook.office365.com/ews/odata/Me/Contacts</a:t>
-            </a:r>
+              <a:t>://</a:t>
+            </a:r>
+            <a:r>
+              <a:rPr lang="en-US" sz="1800" dirty="0" smtClean="0"/>
+              <a:t>outlook.office365.com/</a:t>
+            </a:r>
+            <a:r>
+              <a:rPr lang="en-GB" sz="1800" dirty="0" err="1"/>
+              <a:t>api</a:t>
+            </a:r>
+            <a:r>
+              <a:rPr lang="en-GB" sz="1800" dirty="0"/>
+              <a:t>/v1.0/m</a:t>
+            </a:r>
+            <a:r>
+              <a:rPr lang="en-US" sz="1800" dirty="0" smtClean="0"/>
+              <a:t>e/contacts</a:t>
+            </a:r>
+            <a:endParaRPr lang="en-US" sz="1800" dirty="0"/>
           </a:p>
           <a:p>
             <a:r>
@@ -19206,7 +18836,19 @@
             </a:r>
             <a:r>
               <a:rPr lang="en-US" sz="1800" dirty="0" smtClean="0"/>
-              <a:t>outlook.office365.com/ews/odata/Me/Contacts(</a:t>
+              <a:t>outlook.office365.com/</a:t>
+            </a:r>
+            <a:r>
+              <a:rPr lang="en-GB" sz="1800" dirty="0" err="1" smtClean="0"/>
+              <a:t>api</a:t>
+            </a:r>
+            <a:r>
+              <a:rPr lang="en-GB" sz="1800" dirty="0" smtClean="0"/>
+              <a:t>/v1.0/me</a:t>
+            </a:r>
+            <a:r>
+              <a:rPr lang="en-US" sz="1800" dirty="0" smtClean="0"/>
+              <a:t>/contacts(</a:t>
             </a:r>
             <a:r>
               <a:rPr lang="en-US" sz="1800" dirty="0" smtClean="0">
@@ -19274,6 +18916,30 @@
           <a:chExt cx="0" cy="0"/>
         </a:xfrm>
       </p:grpSpPr>
+      <p:pic>
+        <p:nvPicPr>
+          <p:cNvPr id="2" name="Picture 1"/>
+          <p:cNvPicPr>
+            <a:picLocks noChangeAspect="1"/>
+          </p:cNvPicPr>
+          <p:nvPr/>
+        </p:nvPicPr>
+        <p:blipFill>
+          <a:blip r:embed="rId3"/>
+          <a:stretch>
+            <a:fillRect/>
+          </a:stretch>
+        </p:blipFill>
+        <p:spPr>
+          <a:xfrm>
+            <a:off x="1081386" y="2477048"/>
+            <a:ext cx="7244467" cy="4266907"/>
+          </a:xfrm>
+          <a:prstGeom prst="rect">
+            <a:avLst/>
+          </a:prstGeom>
+        </p:spPr>
+      </p:pic>
       <p:sp>
         <p:nvSpPr>
           <p:cNvPr id="3" name="Title 2"/>
@@ -19389,43 +19055,12 @@
         </p:nvGrpSpPr>
         <p:grpSpPr>
           <a:xfrm>
-            <a:off x="1160782" y="2568540"/>
-            <a:ext cx="9647631" cy="4192922"/>
-            <a:chOff x="965574" y="1803935"/>
-            <a:chExt cx="10976430" cy="4705350"/>
+            <a:off x="5421720" y="4675355"/>
+            <a:ext cx="4805476" cy="1464969"/>
+            <a:chOff x="5530133" y="3799651"/>
+            <a:chExt cx="5467350" cy="1644007"/>
           </a:xfrm>
         </p:grpSpPr>
-        <p:pic>
-          <p:nvPicPr>
-            <p:cNvPr id="16" name="Picture 15"/>
-            <p:cNvPicPr>
-              <a:picLocks noChangeAspect="1"/>
-            </p:cNvPicPr>
-            <p:nvPr/>
-          </p:nvPicPr>
-          <p:blipFill>
-            <a:blip r:embed="rId3"/>
-            <a:stretch>
-              <a:fillRect/>
-            </a:stretch>
-          </p:blipFill>
-          <p:spPr>
-            <a:xfrm>
-              <a:off x="965574" y="1803935"/>
-              <a:ext cx="7524750" cy="4705350"/>
-            </a:xfrm>
-            <a:prstGeom prst="rect">
-              <a:avLst/>
-            </a:prstGeom>
-            <a:ln>
-              <a:solidFill>
-                <a:schemeClr val="bg1">
-                  <a:lumMod val="50000"/>
-                </a:schemeClr>
-              </a:solidFill>
-            </a:ln>
-          </p:spPr>
-        </p:pic>
         <p:cxnSp>
           <p:nvCxnSpPr>
             <p:cNvPr id="8" name="Straight Arrow Connector 7"/>
@@ -19480,7 +19115,7 @@
           </p:blipFill>
           <p:spPr>
             <a:xfrm>
-              <a:off x="6474654" y="3699439"/>
+              <a:off x="5530133" y="4100633"/>
               <a:ext cx="5467350" cy="1343025"/>
             </a:xfrm>
             <a:prstGeom prst="rect">
@@ -19623,7 +19258,7 @@
       </p:sp>
       <p:pic>
         <p:nvPicPr>
-          <p:cNvPr id="5" name="Picture 4"/>
+          <p:cNvPr id="6" name="Picture 5"/>
           <p:cNvPicPr>
             <a:picLocks noChangeAspect="1"/>
           </p:cNvPicPr>
@@ -19637,19 +19272,12 @@
         </p:blipFill>
         <p:spPr>
           <a:xfrm>
-            <a:off x="1214950" y="2633335"/>
-            <a:ext cx="7435025" cy="3985678"/>
+            <a:off x="1539621" y="2561882"/>
+            <a:ext cx="9109582" cy="3517821"/>
           </a:xfrm>
           <a:prstGeom prst="rect">
             <a:avLst/>
           </a:prstGeom>
-          <a:ln>
-            <a:solidFill>
-              <a:schemeClr val="bg1">
-                <a:lumMod val="50000"/>
-              </a:schemeClr>
-            </a:solidFill>
-          </a:ln>
         </p:spPr>
       </p:pic>
     </p:spTree>
@@ -19737,7 +19365,7 @@
                 <a:gridCol w="11225057">
                   <a:extLst>
                     <a:ext uri="{9D8B030D-6E8A-4147-A177-3AD203B41FA5}">
-                      <a16:colId xmlns:a16="http://schemas.microsoft.com/office/drawing/2014/main" val="1253488153"/>
+                      <a16:colId xmlns="" xmlns:a16="http://schemas.microsoft.com/office/drawing/2014/main" val="1253488153"/>
                     </a:ext>
                   </a:extLst>
                 </a:gridCol>
@@ -19759,7 +19387,7 @@
                 </a:tc>
                 <a:extLst>
                   <a:ext uri="{0D108BD9-81ED-4DB2-BD59-A6C34878D82A}">
-                    <a16:rowId xmlns:a16="http://schemas.microsoft.com/office/drawing/2014/main" val="829859176"/>
+                    <a16:rowId xmlns="" xmlns:a16="http://schemas.microsoft.com/office/drawing/2014/main" val="829859176"/>
                   </a:ext>
                 </a:extLst>
               </a:tr>
@@ -19780,7 +19408,7 @@
                 </a:tc>
                 <a:extLst>
                   <a:ext uri="{0D108BD9-81ED-4DB2-BD59-A6C34878D82A}">
-                    <a16:rowId xmlns:a16="http://schemas.microsoft.com/office/drawing/2014/main" val="1946132611"/>
+                    <a16:rowId xmlns="" xmlns:a16="http://schemas.microsoft.com/office/drawing/2014/main" val="1946132611"/>
                   </a:ext>
                 </a:extLst>
               </a:tr>
@@ -19822,7 +19450,7 @@
                 </a:tc>
                 <a:extLst>
                   <a:ext uri="{0D108BD9-81ED-4DB2-BD59-A6C34878D82A}">
-                    <a16:rowId xmlns:a16="http://schemas.microsoft.com/office/drawing/2014/main" val="3204002662"/>
+                    <a16:rowId xmlns="" xmlns:a16="http://schemas.microsoft.com/office/drawing/2014/main" val="3204002662"/>
                   </a:ext>
                 </a:extLst>
               </a:tr>
@@ -19859,7 +19487,7 @@
                 </a:tc>
                 <a:extLst>
                   <a:ext uri="{0D108BD9-81ED-4DB2-BD59-A6C34878D82A}">
-                    <a16:rowId xmlns:a16="http://schemas.microsoft.com/office/drawing/2014/main" val="4266278162"/>
+                    <a16:rowId xmlns="" xmlns:a16="http://schemas.microsoft.com/office/drawing/2014/main" val="4266278162"/>
                   </a:ext>
                 </a:extLst>
               </a:tr>
@@ -19897,7 +19525,7 @@
                 </a:tc>
                 <a:extLst>
                   <a:ext uri="{0D108BD9-81ED-4DB2-BD59-A6C34878D82A}">
-                    <a16:rowId xmlns:a16="http://schemas.microsoft.com/office/drawing/2014/main" val="1664835298"/>
+                    <a16:rowId xmlns="" xmlns:a16="http://schemas.microsoft.com/office/drawing/2014/main" val="1664835298"/>
                   </a:ext>
                 </a:extLst>
               </a:tr>
@@ -19942,7 +19570,7 @@
                 </a:tc>
                 <a:extLst>
                   <a:ext uri="{0D108BD9-81ED-4DB2-BD59-A6C34878D82A}">
-                    <a16:rowId xmlns:a16="http://schemas.microsoft.com/office/drawing/2014/main" val="2026110992"/>
+                    <a16:rowId xmlns="" xmlns:a16="http://schemas.microsoft.com/office/drawing/2014/main" val="2026110992"/>
                   </a:ext>
                 </a:extLst>
               </a:tr>
@@ -19979,7 +19607,7 @@
                 </a:tc>
                 <a:extLst>
                   <a:ext uri="{0D108BD9-81ED-4DB2-BD59-A6C34878D82A}">
-                    <a16:rowId xmlns:a16="http://schemas.microsoft.com/office/drawing/2014/main" val="799351047"/>
+                    <a16:rowId xmlns="" xmlns:a16="http://schemas.microsoft.com/office/drawing/2014/main" val="799351047"/>
                   </a:ext>
                 </a:extLst>
               </a:tr>
@@ -20016,7 +19644,7 @@
                 </a:tc>
                 <a:extLst>
                   <a:ext uri="{0D108BD9-81ED-4DB2-BD59-A6C34878D82A}">
-                    <a16:rowId xmlns:a16="http://schemas.microsoft.com/office/drawing/2014/main" val="384199035"/>
+                    <a16:rowId xmlns="" xmlns:a16="http://schemas.microsoft.com/office/drawing/2014/main" val="384199035"/>
                   </a:ext>
                 </a:extLst>
               </a:tr>
@@ -20090,7 +19718,15 @@
             </a:r>
             <a:r>
               <a:rPr lang="en-US" sz="3200" b="1" dirty="0" smtClean="0"/>
-              <a:t>Me/Contacts(Id)</a:t>
+              <a:t>m</a:t>
+            </a:r>
+            <a:r>
+              <a:rPr lang="en-US" sz="3200" b="1" dirty="0" smtClean="0"/>
+              <a:t>e/contacts(Id</a:t>
+            </a:r>
+            <a:r>
+              <a:rPr lang="en-US" sz="3200" b="1" dirty="0" smtClean="0"/>
+              <a:t>)</a:t>
             </a:r>
             <a:endParaRPr lang="en-US" b="1" dirty="0" smtClean="0"/>
           </a:p>
@@ -20145,7 +19781,7 @@
       </p:sp>
       <p:pic>
         <p:nvPicPr>
-          <p:cNvPr id="5" name="Picture 4"/>
+          <p:cNvPr id="6" name="Picture 5"/>
           <p:cNvPicPr>
             <a:picLocks noChangeAspect="1"/>
           </p:cNvPicPr>
@@ -20159,19 +19795,12 @@
         </p:blipFill>
         <p:spPr>
           <a:xfrm>
-            <a:off x="519111" y="2361363"/>
-            <a:ext cx="7446631" cy="1809945"/>
+            <a:off x="1696334" y="2805190"/>
+            <a:ext cx="8796157" cy="1634463"/>
           </a:xfrm>
           <a:prstGeom prst="rect">
             <a:avLst/>
           </a:prstGeom>
-          <a:ln>
-            <a:solidFill>
-              <a:schemeClr val="bg1">
-                <a:lumMod val="50000"/>
-              </a:schemeClr>
-            </a:solidFill>
-          </a:ln>
         </p:spPr>
       </p:pic>
     </p:spTree>
@@ -23173,13 +22802,13 @@
   <p:clrMapOvr>
     <a:masterClrMapping/>
   </p:clrMapOvr>
-  <mc:AlternateContent xmlns:mc="http://schemas.openxmlformats.org/markup-compatibility/2006">
-    <mc:Choice xmlns:p14="http://schemas.microsoft.com/office/powerpoint/2010/main" Requires="p14">
+  <mc:AlternateContent xmlns:mc="http://schemas.openxmlformats.org/markup-compatibility/2006" xmlns:p14="http://schemas.microsoft.com/office/powerpoint/2010/main">
+    <mc:Choice Requires="p14">
       <p:transition spd="med" p14:dur="700">
         <p:fade/>
       </p:transition>
     </mc:Choice>
-    <mc:Fallback>
+    <mc:Fallback xmlns="">
       <p:transition spd="med">
         <p:fade/>
       </p:transition>
@@ -25633,41 +25262,8 @@
                 <a:latin typeface="Segoe UI Light" panose="020B0502040204020203" pitchFamily="34" charset="0"/>
                 <a:cs typeface="Segoe UI Light" panose="020B0502040204020203" pitchFamily="34" charset="0"/>
               </a:rPr>
-              <a:t>Explore our </a:t>
-            </a:r>
-            <a:r>
-              <a:rPr lang="en-US" sz="3528" dirty="0">
-                <a:gradFill>
-                  <a:gsLst>
-                    <a:gs pos="0">
-                      <a:srgbClr val="FFFFFF"/>
-                    </a:gs>
-                    <a:gs pos="100000">
-                      <a:srgbClr val="FFFFFF"/>
-                    </a:gs>
-                  </a:gsLst>
-                  <a:lin ang="5400000" scaled="1"/>
-                </a:gradFill>
-                <a:latin typeface="Segoe UI Light" panose="020B0502040204020203" pitchFamily="34" charset="0"/>
-                <a:cs typeface="Segoe UI Light" panose="020B0502040204020203" pitchFamily="34" charset="0"/>
-              </a:rPr>
-              <a:t>developer center</a:t>
-            </a:r>
-            <a:endParaRPr lang="en-US" sz="3528" dirty="0">
-              <a:gradFill>
-                <a:gsLst>
-                  <a:gs pos="0">
-                    <a:srgbClr val="FFFFFF"/>
-                  </a:gs>
-                  <a:gs pos="100000">
-                    <a:srgbClr val="FFFFFF"/>
-                  </a:gs>
-                </a:gsLst>
-                <a:lin ang="5400000" scaled="1"/>
-              </a:gradFill>
-              <a:latin typeface="Segoe UI Light" panose="020B0502040204020203" pitchFamily="34" charset="0"/>
-              <a:cs typeface="Segoe UI Light" panose="020B0502040204020203" pitchFamily="34" charset="0"/>
-            </a:endParaRPr>
+              <a:t>Explore our developer center</a:t>
+            </a:r>
           </a:p>
           <a:p>
             <a:pPr marL="51309" lvl="1" defTabSz="565990"/>
@@ -26025,39 +25621,8 @@
                 </a:gradFill>
                 <a:cs typeface="Segoe UI" panose="020B0502040204020203" pitchFamily="34" charset="0"/>
               </a:rPr>
-              <a:t>http</a:t>
-            </a:r>
-            <a:r>
-              <a:rPr lang="en-US" sz="1764" dirty="0">
-                <a:gradFill>
-                  <a:gsLst>
-                    <a:gs pos="0">
-                      <a:srgbClr val="FFFFFF"/>
-                    </a:gs>
-                    <a:gs pos="100000">
-                      <a:srgbClr val="FFFFFF"/>
-                    </a:gs>
-                  </a:gsLst>
-                  <a:lin ang="5400000" scaled="1"/>
-                </a:gradFill>
-                <a:cs typeface="Segoe UI" panose="020B0502040204020203" pitchFamily="34" charset="0"/>
-              </a:rPr>
-              <a:t>://dev.office.com/code-samples</a:t>
-            </a:r>
-            <a:endParaRPr lang="en-US" sz="1764" dirty="0">
-              <a:gradFill>
-                <a:gsLst>
-                  <a:gs pos="0">
-                    <a:srgbClr val="FFFFFF"/>
-                  </a:gs>
-                  <a:gs pos="100000">
-                    <a:srgbClr val="FFFFFF"/>
-                  </a:gs>
-                </a:gsLst>
-                <a:lin ang="5400000" scaled="1"/>
-              </a:gradFill>
-              <a:cs typeface="Segoe UI" panose="020B0502040204020203" pitchFamily="34" charset="0"/>
-            </a:endParaRPr>
+              <a:t>http://dev.office.com/code-samples</a:t>
+            </a:r>
           </a:p>
         </p:txBody>
       </p:sp>
@@ -26767,24 +26332,6 @@
               </a:rPr>
               <a:t>Jumpstart into our training</a:t>
             </a:r>
-            <a:r>
-              <a:rPr lang="en-US" sz="3528" dirty="0">
-                <a:gradFill>
-                  <a:gsLst>
-                    <a:gs pos="0">
-                      <a:srgbClr val="FFFFFF"/>
-                    </a:gs>
-                    <a:gs pos="100000">
-                      <a:srgbClr val="FFFFFF"/>
-                    </a:gs>
-                  </a:gsLst>
-                  <a:lin ang="5400000" scaled="1"/>
-                </a:gradFill>
-                <a:latin typeface="Segoe UI Light" panose="020B0502040204020203" pitchFamily="34" charset="0"/>
-                <a:cs typeface="Segoe UI Light" panose="020B0502040204020203" pitchFamily="34" charset="0"/>
-              </a:rPr>
-              <a:t/>
-            </a:r>
             <a:br>
               <a:rPr lang="en-US" sz="3528" dirty="0">
                 <a:gradFill>
@@ -26817,39 +26364,8 @@
                 </a:gradFill>
                 <a:cs typeface="Segoe UI" panose="020B0502040204020203" pitchFamily="34" charset="0"/>
               </a:rPr>
-              <a:t>http</a:t>
-            </a:r>
-            <a:r>
-              <a:rPr lang="en-US" sz="1764" dirty="0">
-                <a:gradFill>
-                  <a:gsLst>
-                    <a:gs pos="0">
-                      <a:srgbClr val="FFFFFF"/>
-                    </a:gs>
-                    <a:gs pos="100000">
-                      <a:srgbClr val="FFFFFF"/>
-                    </a:gs>
-                  </a:gsLst>
-                  <a:lin ang="5400000" scaled="1"/>
-                </a:gradFill>
-                <a:cs typeface="Segoe UI" panose="020B0502040204020203" pitchFamily="34" charset="0"/>
-              </a:rPr>
-              <a:t>://dev.office.com/training</a:t>
-            </a:r>
-            <a:endParaRPr lang="en-US" sz="1764" dirty="0">
-              <a:gradFill>
-                <a:gsLst>
-                  <a:gs pos="0">
-                    <a:srgbClr val="FFFFFF"/>
-                  </a:gs>
-                  <a:gs pos="100000">
-                    <a:srgbClr val="FFFFFF"/>
-                  </a:gs>
-                </a:gsLst>
-                <a:lin ang="5400000" scaled="1"/>
-              </a:gradFill>
-              <a:cs typeface="Segoe UI" panose="020B0502040204020203" pitchFamily="34" charset="0"/>
-            </a:endParaRPr>
+              <a:t>http://dev.office.com/training</a:t>
+            </a:r>
           </a:p>
         </p:txBody>
       </p:sp>
@@ -26863,13 +26379,13 @@
   <p:clrMapOvr>
     <a:masterClrMapping/>
   </p:clrMapOvr>
-  <mc:AlternateContent xmlns:mc="http://schemas.openxmlformats.org/markup-compatibility/2006">
-    <mc:Choice xmlns:p14="http://schemas.microsoft.com/office/powerpoint/2010/main" Requires="p14">
+  <mc:AlternateContent xmlns:mc="http://schemas.openxmlformats.org/markup-compatibility/2006" xmlns:p14="http://schemas.microsoft.com/office/powerpoint/2010/main">
+    <mc:Choice Requires="p14">
       <p:transition spd="slow" p14:dur="1250">
         <p14:flip dir="r"/>
       </p:transition>
     </mc:Choice>
-    <mc:Fallback>
+    <mc:Fallback xmlns="">
       <p:transition spd="slow">
         <p:fade/>
       </p:transition>
@@ -27749,24 +27265,7 @@
                 </a:gradFill>
                 <a:cs typeface="Segoe UI" panose="020B0502040204020203" pitchFamily="34" charset="0"/>
               </a:rPr>
-              <a:t>Providing </a:t>
-            </a:r>
-            <a:r>
-              <a:rPr lang="en-US" sz="1958" dirty="0">
-                <a:gradFill>
-                  <a:gsLst>
-                    <a:gs pos="0">
-                      <a:srgbClr val="FFFFFF"/>
-                    </a:gs>
-                    <a:gs pos="100000">
-                      <a:srgbClr val="FFFFFF"/>
-                    </a:gs>
-                  </a:gsLst>
-                  <a:lin ang="5400000" scaled="1"/>
-                </a:gradFill>
-                <a:cs typeface="Segoe UI" panose="020B0502040204020203" pitchFamily="34" charset="0"/>
-              </a:rPr>
-              <a:t>App Model Patterns for common </a:t>
+              <a:t>Providing App Model Patterns for common </a:t>
             </a:r>
             <a:br>
               <a:rPr lang="en-US" sz="1958" dirty="0">
@@ -27837,25 +27336,7 @@
                 <a:latin typeface="Segoe UI Light" panose="020B0502040204020203" pitchFamily="34" charset="0"/>
                 <a:cs typeface="Segoe UI Light" panose="020B0502040204020203" pitchFamily="34" charset="0"/>
               </a:rPr>
-              <a:t>60</a:t>
-            </a:r>
-            <a:r>
-              <a:rPr lang="en-US" sz="3916" dirty="0">
-                <a:gradFill>
-                  <a:gsLst>
-                    <a:gs pos="0">
-                      <a:srgbClr val="FFFFFF"/>
-                    </a:gs>
-                    <a:gs pos="100000">
-                      <a:srgbClr val="FFFFFF"/>
-                    </a:gs>
-                  </a:gsLst>
-                  <a:lin ang="5400000" scaled="1"/>
-                </a:gradFill>
-                <a:latin typeface="Segoe UI Light" panose="020B0502040204020203" pitchFamily="34" charset="0"/>
-                <a:cs typeface="Segoe UI Light" panose="020B0502040204020203" pitchFamily="34" charset="0"/>
-              </a:rPr>
-              <a:t>+ Visual Studio projects</a:t>
+              <a:t>60+ Visual Studio projects</a:t>
             </a:r>
             <a:br>
               <a:rPr lang="en-US" sz="3916" dirty="0">
@@ -28437,13 +27918,13 @@
   <p:clrMapOvr>
     <a:masterClrMapping/>
   </p:clrMapOvr>
-  <mc:AlternateContent xmlns:mc="http://schemas.openxmlformats.org/markup-compatibility/2006">
-    <mc:Choice xmlns:p14="http://schemas.microsoft.com/office/powerpoint/2010/main" Requires="p14">
+  <mc:AlternateContent xmlns:mc="http://schemas.openxmlformats.org/markup-compatibility/2006" xmlns:p14="http://schemas.microsoft.com/office/powerpoint/2010/main">
+    <mc:Choice Requires="p14">
       <p:transition spd="slow" p14:dur="1250">
         <p14:flip dir="l"/>
       </p:transition>
     </mc:Choice>
-    <mc:Fallback>
+    <mc:Fallback xmlns="">
       <p:transition spd="slow">
         <p:fade/>
       </p:transition>
@@ -28976,21 +28457,6 @@
                 </a:rPr>
                 <a:t>Aug</a:t>
               </a:r>
-              <a:endParaRPr lang="en-US" sz="1960" dirty="0">
-                <a:gradFill>
-                  <a:gsLst>
-                    <a:gs pos="0">
-                      <a:schemeClr val="tx1"/>
-                    </a:gs>
-                    <a:gs pos="100000">
-                      <a:schemeClr val="tx1"/>
-                    </a:gs>
-                  </a:gsLst>
-                  <a:lin ang="5400000" scaled="0"/>
-                </a:gradFill>
-                <a:latin typeface="Segoe UI" panose="020B0502040204020203" pitchFamily="34" charset="0"/>
-                <a:cs typeface="Segoe UI" panose="020B0502040204020203" pitchFamily="34" charset="0"/>
-              </a:endParaRPr>
             </a:p>
           </p:txBody>
         </p:sp>
@@ -29052,21 +28518,6 @@
                 </a:rPr>
                 <a:t>Sept</a:t>
               </a:r>
-              <a:endParaRPr lang="en-US" sz="1960" dirty="0">
-                <a:gradFill>
-                  <a:gsLst>
-                    <a:gs pos="0">
-                      <a:schemeClr val="tx1"/>
-                    </a:gs>
-                    <a:gs pos="100000">
-                      <a:schemeClr val="tx1"/>
-                    </a:gs>
-                  </a:gsLst>
-                  <a:lin ang="5400000" scaled="0"/>
-                </a:gradFill>
-                <a:latin typeface="Segoe UI" panose="020B0502040204020203" pitchFamily="34" charset="0"/>
-                <a:cs typeface="Segoe UI" panose="020B0502040204020203" pitchFamily="34" charset="0"/>
-              </a:endParaRPr>
             </a:p>
           </p:txBody>
         </p:sp>
@@ -29128,21 +28579,6 @@
                 </a:rPr>
                 <a:t>Oct</a:t>
               </a:r>
-              <a:endParaRPr lang="en-US" sz="1960" dirty="0">
-                <a:gradFill>
-                  <a:gsLst>
-                    <a:gs pos="0">
-                      <a:schemeClr val="tx1"/>
-                    </a:gs>
-                    <a:gs pos="100000">
-                      <a:schemeClr val="tx1"/>
-                    </a:gs>
-                  </a:gsLst>
-                  <a:lin ang="5400000" scaled="0"/>
-                </a:gradFill>
-                <a:latin typeface="Segoe UI" panose="020B0502040204020203" pitchFamily="34" charset="0"/>
-                <a:cs typeface="Segoe UI" panose="020B0502040204020203" pitchFamily="34" charset="0"/>
-              </a:endParaRPr>
             </a:p>
           </p:txBody>
         </p:sp>
@@ -29523,21 +28959,6 @@
                 </a:rPr>
                 <a:t>Jan</a:t>
               </a:r>
-              <a:endParaRPr lang="en-US" sz="1960" dirty="0">
-                <a:gradFill>
-                  <a:gsLst>
-                    <a:gs pos="0">
-                      <a:schemeClr val="tx1"/>
-                    </a:gs>
-                    <a:gs pos="100000">
-                      <a:schemeClr val="tx1"/>
-                    </a:gs>
-                  </a:gsLst>
-                  <a:lin ang="5400000" scaled="0"/>
-                </a:gradFill>
-                <a:latin typeface="Segoe UI" panose="020B0502040204020203" pitchFamily="34" charset="0"/>
-                <a:cs typeface="Segoe UI" panose="020B0502040204020203" pitchFamily="34" charset="0"/>
-              </a:endParaRPr>
             </a:p>
           </p:txBody>
         </p:sp>
@@ -29599,21 +29020,6 @@
                 </a:rPr>
                 <a:t>Nov</a:t>
               </a:r>
-              <a:endParaRPr lang="en-US" sz="1960" dirty="0">
-                <a:gradFill>
-                  <a:gsLst>
-                    <a:gs pos="0">
-                      <a:schemeClr val="tx1"/>
-                    </a:gs>
-                    <a:gs pos="100000">
-                      <a:schemeClr val="tx1"/>
-                    </a:gs>
-                  </a:gsLst>
-                  <a:lin ang="5400000" scaled="0"/>
-                </a:gradFill>
-                <a:latin typeface="Segoe UI" panose="020B0502040204020203" pitchFamily="34" charset="0"/>
-                <a:cs typeface="Segoe UI" panose="020B0502040204020203" pitchFamily="34" charset="0"/>
-              </a:endParaRPr>
             </a:p>
           </p:txBody>
         </p:sp>
@@ -29675,21 +29081,6 @@
                 </a:rPr>
                 <a:t>Dec</a:t>
               </a:r>
-              <a:endParaRPr lang="en-US" sz="1960" dirty="0">
-                <a:gradFill>
-                  <a:gsLst>
-                    <a:gs pos="0">
-                      <a:schemeClr val="tx1"/>
-                    </a:gs>
-                    <a:gs pos="100000">
-                      <a:schemeClr val="tx1"/>
-                    </a:gs>
-                  </a:gsLst>
-                  <a:lin ang="5400000" scaled="0"/>
-                </a:gradFill>
-                <a:latin typeface="Segoe UI" panose="020B0502040204020203" pitchFamily="34" charset="0"/>
-                <a:cs typeface="Segoe UI" panose="020B0502040204020203" pitchFamily="34" charset="0"/>
-              </a:endParaRPr>
             </a:p>
           </p:txBody>
         </p:sp>
@@ -30439,40 +29830,7 @@
                   <a:ea typeface="Segoe UI" panose="020B0502040204020203" pitchFamily="34" charset="0"/>
                   <a:cs typeface="Segoe UI Semibold" panose="020B0702040204020203" pitchFamily="34" charset="0"/>
                 </a:rPr>
-                <a:t>Shipping </a:t>
-              </a:r>
-              <a:r>
-                <a:rPr lang="en-US" sz="1372" dirty="0">
-                  <a:solidFill>
-                    <a:schemeClr val="accent6"/>
-                  </a:solidFill>
-                  <a:latin typeface="Segoe UI Semibold" panose="020B0702040204020203" pitchFamily="34" charset="0"/>
-                  <a:ea typeface="Segoe UI" panose="020B0502040204020203" pitchFamily="34" charset="0"/>
-                  <a:cs typeface="Segoe UI Semibold" panose="020B0702040204020203" pitchFamily="34" charset="0"/>
-                </a:rPr>
-                <a:t>your </a:t>
-              </a:r>
-              <a:r>
-                <a:rPr lang="en-US" sz="1372" dirty="0">
-                  <a:solidFill>
-                    <a:schemeClr val="accent6"/>
-                  </a:solidFill>
-                  <a:latin typeface="Segoe UI Semibold" panose="020B0702040204020203" pitchFamily="34" charset="0"/>
-                  <a:ea typeface="Segoe UI" panose="020B0502040204020203" pitchFamily="34" charset="0"/>
-                  <a:cs typeface="Segoe UI Semibold" panose="020B0702040204020203" pitchFamily="34" charset="0"/>
-                </a:rPr>
-                <a:t>Office 365 </a:t>
-              </a:r>
-              <a:r>
-                <a:rPr lang="en-US" sz="1372" dirty="0">
-                  <a:solidFill>
-                    <a:schemeClr val="accent6"/>
-                  </a:solidFill>
-                  <a:latin typeface="Segoe UI Semibold" panose="020B0702040204020203" pitchFamily="34" charset="0"/>
-                  <a:ea typeface="Segoe UI" panose="020B0502040204020203" pitchFamily="34" charset="0"/>
-                  <a:cs typeface="Segoe UI Semibold" panose="020B0702040204020203" pitchFamily="34" charset="0"/>
-                </a:rPr>
-                <a:t>App </a:t>
+                <a:t>Shipping your Office 365 App </a:t>
               </a:r>
               <a:br>
                 <a:rPr lang="en-US" sz="1372" dirty="0">
@@ -30516,14 +29874,6 @@
                 </a:rPr>
                 <a:t>Office Store </a:t>
               </a:r>
-              <a:endParaRPr lang="en-US" sz="1372" dirty="0">
-                <a:solidFill>
-                  <a:schemeClr val="accent6"/>
-                </a:solidFill>
-                <a:latin typeface="Segoe UI Semibold" panose="020B0702040204020203" pitchFamily="34" charset="0"/>
-                <a:ea typeface="Segoe UI" panose="020B0502040204020203" pitchFamily="34" charset="0"/>
-                <a:cs typeface="Segoe UI Semibold" panose="020B0702040204020203" pitchFamily="34" charset="0"/>
-              </a:endParaRPr>
             </a:p>
           </p:txBody>
         </p:sp>
@@ -30597,17 +29947,6 @@
                 </a:rPr>
                 <a:t>Deep dive into </a:t>
               </a:r>
-              <a:r>
-                <a:rPr lang="en-US" sz="1372" dirty="0">
-                  <a:solidFill>
-                    <a:schemeClr val="accent6"/>
-                  </a:solidFill>
-                  <a:latin typeface="Segoe UI Semibold" panose="020B0702040204020203" pitchFamily="34" charset="0"/>
-                  <a:ea typeface="Segoe UI" panose="020B0502040204020203" pitchFamily="34" charset="0"/>
-                  <a:cs typeface="Segoe UI Semibold" panose="020B0702040204020203" pitchFamily="34" charset="0"/>
-                </a:rPr>
-                <a:t/>
-              </a:r>
               <a:br>
                 <a:rPr lang="en-US" sz="1372" dirty="0">
                   <a:solidFill>
@@ -30627,18 +29966,7 @@
                   <a:ea typeface="Segoe UI" panose="020B0502040204020203" pitchFamily="34" charset="0"/>
                   <a:cs typeface="Segoe UI Semibold" panose="020B0702040204020203" pitchFamily="34" charset="0"/>
                 </a:rPr>
-                <a:t>the </a:t>
-              </a:r>
-              <a:r>
-                <a:rPr lang="en-US" sz="1372" dirty="0">
-                  <a:solidFill>
-                    <a:schemeClr val="accent6"/>
-                  </a:solidFill>
-                  <a:latin typeface="Segoe UI Semibold" panose="020B0702040204020203" pitchFamily="34" charset="0"/>
-                  <a:ea typeface="Segoe UI" panose="020B0502040204020203" pitchFamily="34" charset="0"/>
-                  <a:cs typeface="Segoe UI Semibold" panose="020B0702040204020203" pitchFamily="34" charset="0"/>
-                </a:rPr>
-                <a:t>building blocks and services of the SharePoint platform </a:t>
+                <a:t>the building blocks and services of the SharePoint platform </a:t>
               </a:r>
             </a:p>
           </p:txBody>
@@ -30829,21 +30157,6 @@
                 </a:rPr>
                 <a:t>Feb</a:t>
               </a:r>
-              <a:endParaRPr lang="en-US" sz="1960" dirty="0">
-                <a:gradFill>
-                  <a:gsLst>
-                    <a:gs pos="0">
-                      <a:schemeClr val="tx1"/>
-                    </a:gs>
-                    <a:gs pos="100000">
-                      <a:schemeClr val="tx1"/>
-                    </a:gs>
-                  </a:gsLst>
-                  <a:lin ang="5400000" scaled="0"/>
-                </a:gradFill>
-                <a:latin typeface="Segoe UI" panose="020B0502040204020203" pitchFamily="34" charset="0"/>
-                <a:cs typeface="Segoe UI" panose="020B0502040204020203" pitchFamily="34" charset="0"/>
-              </a:endParaRPr>
             </a:p>
           </p:txBody>
         </p:sp>
@@ -31521,26 +30834,7 @@
                 <a:ea typeface="Segoe UI" pitchFamily="34" charset="0"/>
                 <a:cs typeface="Segoe UI" pitchFamily="34" charset="0"/>
               </a:rPr>
-              <a:t>2014 </a:t>
-            </a:r>
-            <a:r>
-              <a:rPr lang="en-US" sz="700" dirty="0" smtClean="0">
-                <a:gradFill>
-                  <a:gsLst>
-                    <a:gs pos="0">
-                      <a:schemeClr val="tx1"/>
-                    </a:gs>
-                    <a:gs pos="100000">
-                      <a:schemeClr val="tx1"/>
-                    </a:gs>
-                  </a:gsLst>
-                  <a:lin ang="5400000" scaled="0"/>
-                </a:gradFill>
-                <a:latin typeface="Segoe UI" pitchFamily="34" charset="0"/>
-                <a:ea typeface="Segoe UI" pitchFamily="34" charset="0"/>
-                <a:cs typeface="Segoe UI" pitchFamily="34" charset="0"/>
-              </a:rPr>
-              <a:t>Microsoft </a:t>
+              <a:t>2014 Microsoft </a:t>
             </a:r>
             <a:r>
               <a:rPr lang="en-US" sz="700" dirty="0">
@@ -31815,13 +31109,13 @@
   <p:clrMapOvr>
     <a:masterClrMapping/>
   </p:clrMapOvr>
-  <mc:AlternateContent xmlns:mc="http://schemas.openxmlformats.org/markup-compatibility/2006">
-    <mc:Choice xmlns:p14="http://schemas.microsoft.com/office/powerpoint/2010/main" Requires="p14">
+  <mc:AlternateContent xmlns:mc="http://schemas.openxmlformats.org/markup-compatibility/2006" xmlns:p14="http://schemas.microsoft.com/office/powerpoint/2010/main">
+    <mc:Choice Requires="p14">
       <p:transition spd="slow" p14:dur="3400">
         <p14:reveal/>
       </p:transition>
     </mc:Choice>
-    <mc:Fallback>
+    <mc:Fallback xmlns="">
       <p:transition spd="slow">
         <p:fade/>
       </p:transition>
@@ -31871,15 +31165,7 @@
           <a:p>
             <a:r>
               <a:rPr lang="en-US" sz="4800" b="1" dirty="0" smtClean="0"/>
-              <a:t>Deep Dive into Office 365 APIs for Calendar, Mail, </a:t>
-            </a:r>
-            <a:r>
-              <a:rPr lang="en-US" sz="4800" b="1" dirty="0" smtClean="0"/>
-              <a:t>and</a:t>
-            </a:r>
-            <a:r>
-              <a:rPr lang="en-US" sz="4800" b="1" dirty="0" smtClean="0"/>
-              <a:t> Contacts</a:t>
+              <a:t>Deep Dive into Office 365 APIs for Calendar, Mail, and Contacts</a:t>
             </a:r>
             <a:endParaRPr lang="en-US" dirty="0"/>
           </a:p>
@@ -32290,15 +31576,25 @@
             <a:pPr lvl="1"/>
             <a:r>
               <a:rPr lang="en-US" sz="1800" b="1" dirty="0"/>
-              <a:t>https://outlook.office365.com/ews/odata/Me/Inbox/Messages</a:t>
-            </a:r>
+              <a:t>https://</a:t>
+            </a:r>
+            <a:r>
+              <a:rPr lang="en-US" sz="1800" b="1" dirty="0" smtClean="0"/>
+              <a:t>outlook.office365.com/api/v1.0/me/messages</a:t>
+            </a:r>
+            <a:endParaRPr lang="en-US" sz="1800" b="1" dirty="0"/>
           </a:p>
           <a:p>
             <a:pPr lvl="1"/>
             <a:r>
               <a:rPr lang="en-US" sz="1800" b="1" dirty="0"/>
-              <a:t>https://outlook.office365.com/ews/odata/Me/Events</a:t>
-            </a:r>
+              <a:t>https</a:t>
+            </a:r>
+            <a:r>
+              <a:rPr lang="en-US" sz="1800" b="1" dirty="0" smtClean="0"/>
+              <a:t>://outlook.office365.com/api/v1.0/me/events</a:t>
+            </a:r>
+            <a:endParaRPr lang="en-US" sz="1800" b="1" dirty="0"/>
           </a:p>
           <a:p>
             <a:pPr lvl="1"/>
@@ -32312,7 +31608,7 @@
             </a:r>
             <a:r>
               <a:rPr lang="en-US" sz="1800" b="1" dirty="0" smtClean="0"/>
-              <a:t>outlook.office365.com/ews/odata/Me/Contacts</a:t>
+              <a:t>outlook.office365.com/api/v1.0/me/contacts</a:t>
             </a:r>
           </a:p>
           <a:p>
@@ -32327,12 +31623,9 @@
             </a:r>
             <a:r>
               <a:rPr lang="en-US" sz="3600" dirty="0" err="1" smtClean="0"/>
-              <a:t>ExchangeClient</a:t>
-            </a:r>
-            <a:r>
-              <a:rPr lang="en-US" sz="3600" dirty="0" smtClean="0"/>
-              <a:t> library</a:t>
-            </a:r>
+              <a:t>OutlookServicesClient</a:t>
+            </a:r>
+            <a:endParaRPr lang="en-US" sz="3600" dirty="0" smtClean="0"/>
           </a:p>
           <a:p>
             <a:pPr lvl="1"/>
@@ -32529,129 +31822,107 @@
           </a:ln>
         </p:spPr>
       </p:pic>
-      <p:grpSp>
-        <p:nvGrpSpPr>
-          <p:cNvPr id="8" name="Group 7"/>
-          <p:cNvGrpSpPr/>
+      <p:sp>
+        <p:nvSpPr>
+          <p:cNvPr id="7" name="Rectangle 6"/>
+          <p:cNvSpPr/>
           <p:nvPr/>
-        </p:nvGrpSpPr>
-        <p:grpSpPr>
+        </p:nvSpPr>
+        <p:spPr bwMode="auto">
           <a:xfrm>
             <a:off x="8425636" y="794883"/>
-            <a:ext cx="1997813" cy="3774374"/>
-            <a:chOff x="9915389" y="602548"/>
-            <a:chExt cx="1997813" cy="3774374"/>
+            <a:ext cx="1997813" cy="373949"/>
           </a:xfrm>
-        </p:grpSpPr>
-        <p:pic>
-          <p:nvPicPr>
-            <p:cNvPr id="5" name="Picture 4"/>
-            <p:cNvPicPr>
-              <a:picLocks noChangeAspect="1"/>
-            </p:cNvPicPr>
-            <p:nvPr/>
-          </p:nvPicPr>
-          <p:blipFill>
-            <a:blip r:embed="rId3"/>
-            <a:stretch>
-              <a:fillRect/>
-            </a:stretch>
-          </p:blipFill>
-          <p:spPr>
-            <a:xfrm>
-              <a:off x="9922576" y="976497"/>
-              <a:ext cx="1981200" cy="3400425"/>
-            </a:xfrm>
-            <a:prstGeom prst="rect">
+          <a:prstGeom prst="rect">
+            <a:avLst/>
+          </a:prstGeom>
+          <a:solidFill>
+            <a:schemeClr val="accent5"/>
+          </a:solidFill>
+          <a:ln>
+            <a:noFill/>
+            <a:headEnd type="none" w="med" len="med"/>
+            <a:tailEnd type="none" w="med" len="med"/>
+          </a:ln>
+          <a:effectLst/>
+        </p:spPr>
+        <p:style>
+          <a:lnRef idx="1">
+            <a:schemeClr val="accent2"/>
+          </a:lnRef>
+          <a:fillRef idx="3">
+            <a:schemeClr val="accent2"/>
+          </a:fillRef>
+          <a:effectRef idx="2">
+            <a:schemeClr val="accent2"/>
+          </a:effectRef>
+          <a:fontRef idx="minor">
+            <a:schemeClr val="lt1"/>
+          </a:fontRef>
+        </p:style>
+        <p:txBody>
+          <a:bodyPr rot="0" spcFirstLastPara="0" vertOverflow="overflow" horzOverflow="overflow" vert="horz" wrap="square" lIns="45720" tIns="45720" rIns="45720" bIns="45720" numCol="1" spcCol="0" rtlCol="0" fromWordArt="0" anchor="ctr" anchorCtr="0" forceAA="0" compatLnSpc="1">
+            <a:prstTxWarp prst="textNoShape">
               <a:avLst/>
-            </a:prstGeom>
-            <a:ln>
-              <a:solidFill>
-                <a:schemeClr val="bg1">
-                  <a:lumMod val="50000"/>
-                </a:schemeClr>
-              </a:solidFill>
-            </a:ln>
-          </p:spPr>
-        </p:pic>
-        <p:sp>
-          <p:nvSpPr>
-            <p:cNvPr id="7" name="Rectangle 6"/>
-            <p:cNvSpPr/>
-            <p:nvPr/>
-          </p:nvSpPr>
-          <p:spPr bwMode="auto">
-            <a:xfrm>
-              <a:off x="9915389" y="602548"/>
-              <a:ext cx="1997813" cy="373949"/>
-            </a:xfrm>
-            <a:prstGeom prst="rect">
-              <a:avLst/>
-            </a:prstGeom>
-            <a:solidFill>
-              <a:schemeClr val="accent5"/>
-            </a:solidFill>
-            <a:ln>
-              <a:noFill/>
-              <a:headEnd type="none" w="med" len="med"/>
-              <a:tailEnd type="none" w="med" len="med"/>
-            </a:ln>
-            <a:effectLst/>
-          </p:spPr>
-          <p:style>
-            <a:lnRef idx="1">
-              <a:schemeClr val="accent2"/>
-            </a:lnRef>
-            <a:fillRef idx="3">
-              <a:schemeClr val="accent2"/>
-            </a:fillRef>
-            <a:effectRef idx="2">
-              <a:schemeClr val="accent2"/>
-            </a:effectRef>
-            <a:fontRef idx="minor">
-              <a:schemeClr val="lt1"/>
-            </a:fontRef>
-          </p:style>
-          <p:txBody>
-            <a:bodyPr rot="0" spcFirstLastPara="0" vertOverflow="overflow" horzOverflow="overflow" vert="horz" wrap="square" lIns="45720" tIns="45720" rIns="45720" bIns="45720" numCol="1" spcCol="0" rtlCol="0" fromWordArt="0" anchor="ctr" anchorCtr="0" forceAA="0" compatLnSpc="1">
-              <a:prstTxWarp prst="textNoShape">
-                <a:avLst/>
-              </a:prstTxWarp>
-              <a:noAutofit/>
-            </a:bodyPr>
-            <a:lstStyle/>
-            <a:p>
-              <a:pPr algn="ctr" defTabSz="914099" fontAlgn="base">
-                <a:spcBef>
-                  <a:spcPct val="0"/>
-                </a:spcBef>
-                <a:spcAft>
-                  <a:spcPct val="0"/>
-                </a:spcAft>
-              </a:pPr>
-              <a:r>
-                <a:rPr lang="en-US" dirty="0" smtClean="0">
-                  <a:gradFill>
-                    <a:gsLst>
-                      <a:gs pos="0">
-                        <a:srgbClr val="FFFFFF"/>
-                      </a:gs>
-                      <a:gs pos="100000">
-                        <a:srgbClr val="FFFFFF"/>
-                      </a:gs>
-                    </a:gsLst>
-                    <a:lin ang="5400000" scaled="0"/>
-                  </a:gradFill>
-                  <a:latin typeface="Arial" panose="020B0604020202020204" pitchFamily="34" charset="0"/>
-                  <a:ea typeface="Segoe UI" pitchFamily="34" charset="0"/>
-                  <a:cs typeface="Arial" panose="020B0604020202020204" pitchFamily="34" charset="0"/>
-                </a:rPr>
-                <a:t>Message</a:t>
-              </a:r>
-            </a:p>
-          </p:txBody>
-        </p:sp>
-      </p:grpSp>
+            </a:prstTxWarp>
+            <a:noAutofit/>
+          </a:bodyPr>
+          <a:lstStyle/>
+          <a:p>
+            <a:pPr algn="ctr" defTabSz="914099" fontAlgn="base">
+              <a:spcBef>
+                <a:spcPct val="0"/>
+              </a:spcBef>
+              <a:spcAft>
+                <a:spcPct val="0"/>
+              </a:spcAft>
+            </a:pPr>
+            <a:r>
+              <a:rPr lang="en-US" dirty="0" smtClean="0">
+                <a:gradFill>
+                  <a:gsLst>
+                    <a:gs pos="0">
+                      <a:srgbClr val="FFFFFF"/>
+                    </a:gs>
+                    <a:gs pos="100000">
+                      <a:srgbClr val="FFFFFF"/>
+                    </a:gs>
+                  </a:gsLst>
+                  <a:lin ang="5400000" scaled="0"/>
+                </a:gradFill>
+                <a:latin typeface="Arial" panose="020B0604020202020204" pitchFamily="34" charset="0"/>
+                <a:ea typeface="Segoe UI" pitchFamily="34" charset="0"/>
+                <a:cs typeface="Arial" panose="020B0604020202020204" pitchFamily="34" charset="0"/>
+              </a:rPr>
+              <a:t>Message</a:t>
+            </a:r>
+          </a:p>
+        </p:txBody>
+      </p:sp>
+      <p:pic>
+        <p:nvPicPr>
+          <p:cNvPr id="9" name="Picture 8"/>
+          <p:cNvPicPr>
+            <a:picLocks noChangeAspect="1"/>
+          </p:cNvPicPr>
+          <p:nvPr/>
+        </p:nvPicPr>
+        <p:blipFill>
+          <a:blip r:embed="rId3"/>
+          <a:stretch>
+            <a:fillRect/>
+          </a:stretch>
+        </p:blipFill>
+        <p:spPr>
+          <a:xfrm>
+            <a:off x="8381685" y="1131862"/>
+            <a:ext cx="2085714" cy="3723809"/>
+          </a:xfrm>
+          <a:prstGeom prst="rect">
+            <a:avLst/>
+          </a:prstGeom>
+        </p:spPr>
+      </p:pic>
     </p:spTree>
     <p:extLst>
       <p:ext uri="{BB962C8B-B14F-4D97-AF65-F5344CB8AC3E}">
@@ -32829,129 +32100,107 @@
           </a:ln>
         </p:spPr>
       </p:pic>
-      <p:grpSp>
-        <p:nvGrpSpPr>
-          <p:cNvPr id="11" name="Group 10"/>
-          <p:cNvGrpSpPr/>
+      <p:sp>
+        <p:nvSpPr>
+          <p:cNvPr id="10" name="Rectangle 9"/>
+          <p:cNvSpPr/>
           <p:nvPr/>
-        </p:nvGrpSpPr>
-        <p:grpSpPr>
+        </p:nvSpPr>
+        <p:spPr bwMode="auto">
           <a:xfrm>
             <a:off x="9708891" y="1784691"/>
-            <a:ext cx="2075754" cy="2761000"/>
-            <a:chOff x="8106123" y="2853438"/>
-            <a:chExt cx="2075754" cy="2761000"/>
+            <a:ext cx="2075754" cy="373949"/>
           </a:xfrm>
-        </p:grpSpPr>
-        <p:pic>
-          <p:nvPicPr>
-            <p:cNvPr id="7" name="Picture 6"/>
-            <p:cNvPicPr>
-              <a:picLocks noChangeAspect="1"/>
-            </p:cNvPicPr>
-            <p:nvPr/>
-          </p:nvPicPr>
-          <p:blipFill>
-            <a:blip r:embed="rId3"/>
-            <a:stretch>
-              <a:fillRect/>
-            </a:stretch>
-          </p:blipFill>
-          <p:spPr>
-            <a:xfrm>
-              <a:off x="8117411" y="3223663"/>
-              <a:ext cx="2057400" cy="2390775"/>
-            </a:xfrm>
-            <a:prstGeom prst="rect">
+          <a:prstGeom prst="rect">
+            <a:avLst/>
+          </a:prstGeom>
+          <a:solidFill>
+            <a:schemeClr val="accent5"/>
+          </a:solidFill>
+          <a:ln>
+            <a:noFill/>
+            <a:headEnd type="none" w="med" len="med"/>
+            <a:tailEnd type="none" w="med" len="med"/>
+          </a:ln>
+          <a:effectLst/>
+        </p:spPr>
+        <p:style>
+          <a:lnRef idx="1">
+            <a:schemeClr val="accent2"/>
+          </a:lnRef>
+          <a:fillRef idx="3">
+            <a:schemeClr val="accent2"/>
+          </a:fillRef>
+          <a:effectRef idx="2">
+            <a:schemeClr val="accent2"/>
+          </a:effectRef>
+          <a:fontRef idx="minor">
+            <a:schemeClr val="lt1"/>
+          </a:fontRef>
+        </p:style>
+        <p:txBody>
+          <a:bodyPr rot="0" spcFirstLastPara="0" vertOverflow="overflow" horzOverflow="overflow" vert="horz" wrap="square" lIns="45720" tIns="45720" rIns="45720" bIns="45720" numCol="1" spcCol="0" rtlCol="0" fromWordArt="0" anchor="ctr" anchorCtr="0" forceAA="0" compatLnSpc="1">
+            <a:prstTxWarp prst="textNoShape">
               <a:avLst/>
-            </a:prstGeom>
-            <a:ln>
-              <a:solidFill>
-                <a:schemeClr val="bg1">
-                  <a:lumMod val="50000"/>
-                </a:schemeClr>
-              </a:solidFill>
-            </a:ln>
-          </p:spPr>
-        </p:pic>
-        <p:sp>
-          <p:nvSpPr>
-            <p:cNvPr id="10" name="Rectangle 9"/>
-            <p:cNvSpPr/>
-            <p:nvPr/>
-          </p:nvSpPr>
-          <p:spPr bwMode="auto">
-            <a:xfrm>
-              <a:off x="8106123" y="2853438"/>
-              <a:ext cx="2075754" cy="373949"/>
-            </a:xfrm>
-            <a:prstGeom prst="rect">
-              <a:avLst/>
-            </a:prstGeom>
-            <a:solidFill>
-              <a:schemeClr val="accent5"/>
-            </a:solidFill>
-            <a:ln>
-              <a:noFill/>
-              <a:headEnd type="none" w="med" len="med"/>
-              <a:tailEnd type="none" w="med" len="med"/>
-            </a:ln>
-            <a:effectLst/>
-          </p:spPr>
-          <p:style>
-            <a:lnRef idx="1">
-              <a:schemeClr val="accent2"/>
-            </a:lnRef>
-            <a:fillRef idx="3">
-              <a:schemeClr val="accent2"/>
-            </a:fillRef>
-            <a:effectRef idx="2">
-              <a:schemeClr val="accent2"/>
-            </a:effectRef>
-            <a:fontRef idx="minor">
-              <a:schemeClr val="lt1"/>
-            </a:fontRef>
-          </p:style>
-          <p:txBody>
-            <a:bodyPr rot="0" spcFirstLastPara="0" vertOverflow="overflow" horzOverflow="overflow" vert="horz" wrap="square" lIns="45720" tIns="45720" rIns="45720" bIns="45720" numCol="1" spcCol="0" rtlCol="0" fromWordArt="0" anchor="ctr" anchorCtr="0" forceAA="0" compatLnSpc="1">
-              <a:prstTxWarp prst="textNoShape">
-                <a:avLst/>
-              </a:prstTxWarp>
-              <a:noAutofit/>
-            </a:bodyPr>
-            <a:lstStyle/>
-            <a:p>
-              <a:pPr algn="ctr" defTabSz="914099" fontAlgn="base">
-                <a:spcBef>
-                  <a:spcPct val="0"/>
-                </a:spcBef>
-                <a:spcAft>
-                  <a:spcPct val="0"/>
-                </a:spcAft>
-              </a:pPr>
-              <a:r>
-                <a:rPr lang="en-US" dirty="0" smtClean="0">
-                  <a:gradFill>
-                    <a:gsLst>
-                      <a:gs pos="0">
-                        <a:srgbClr val="FFFFFF"/>
-                      </a:gs>
-                      <a:gs pos="100000">
-                        <a:srgbClr val="FFFFFF"/>
-                      </a:gs>
-                    </a:gsLst>
-                    <a:lin ang="5400000" scaled="0"/>
-                  </a:gradFill>
-                  <a:latin typeface="Arial" panose="020B0604020202020204" pitchFamily="34" charset="0"/>
-                  <a:ea typeface="Segoe UI" pitchFamily="34" charset="0"/>
-                  <a:cs typeface="Arial" panose="020B0604020202020204" pitchFamily="34" charset="0"/>
-                </a:rPr>
-                <a:t>Event</a:t>
-              </a:r>
-            </a:p>
-          </p:txBody>
-        </p:sp>
-      </p:grpSp>
+            </a:prstTxWarp>
+            <a:noAutofit/>
+          </a:bodyPr>
+          <a:lstStyle/>
+          <a:p>
+            <a:pPr algn="ctr" defTabSz="914099" fontAlgn="base">
+              <a:spcBef>
+                <a:spcPct val="0"/>
+              </a:spcBef>
+              <a:spcAft>
+                <a:spcPct val="0"/>
+              </a:spcAft>
+            </a:pPr>
+            <a:r>
+              <a:rPr lang="en-US" dirty="0" smtClean="0">
+                <a:gradFill>
+                  <a:gsLst>
+                    <a:gs pos="0">
+                      <a:srgbClr val="FFFFFF"/>
+                    </a:gs>
+                    <a:gs pos="100000">
+                      <a:srgbClr val="FFFFFF"/>
+                    </a:gs>
+                  </a:gsLst>
+                  <a:lin ang="5400000" scaled="0"/>
+                </a:gradFill>
+                <a:latin typeface="Arial" panose="020B0604020202020204" pitchFamily="34" charset="0"/>
+                <a:ea typeface="Segoe UI" pitchFamily="34" charset="0"/>
+                <a:cs typeface="Arial" panose="020B0604020202020204" pitchFamily="34" charset="0"/>
+              </a:rPr>
+              <a:t>Event</a:t>
+            </a:r>
+          </a:p>
+        </p:txBody>
+      </p:sp>
+      <p:pic>
+        <p:nvPicPr>
+          <p:cNvPr id="5" name="Picture 4"/>
+          <p:cNvPicPr>
+            <a:picLocks noChangeAspect="1"/>
+          </p:cNvPicPr>
+          <p:nvPr/>
+        </p:nvPicPr>
+        <p:blipFill>
+          <a:blip r:embed="rId3"/>
+          <a:stretch>
+            <a:fillRect/>
+          </a:stretch>
+        </p:blipFill>
+        <p:spPr>
+          <a:xfrm>
+            <a:off x="9719390" y="2146608"/>
+            <a:ext cx="2057143" cy="3761905"/>
+          </a:xfrm>
+          <a:prstGeom prst="rect">
+            <a:avLst/>
+          </a:prstGeom>
+        </p:spPr>
+      </p:pic>
     </p:spTree>
     <p:extLst>
       <p:ext uri="{BB962C8B-B14F-4D97-AF65-F5344CB8AC3E}">

</xml_diff>